<commit_message>
Remove old site folder and add new files
</commit_message>
<xml_diff>
--- a/thesis/abs/csn-sildebaocao-webbandt.pptx
+++ b/thesis/abs/csn-sildebaocao-webbandt.pptx
@@ -5,7 +5,7 @@
     <p:sldMasterId id="2147483648" r:id="rId1"/>
   </p:sldMasterIdLst>
   <p:notesMasterIdLst>
-    <p:notesMasterId r:id="rId26"/>
+    <p:notesMasterId r:id="rId25"/>
   </p:notesMasterIdLst>
   <p:sldIdLst>
     <p:sldId id="262" r:id="rId3"/>
@@ -15,22 +15,21 @@
     <p:sldId id="292" r:id="rId7"/>
     <p:sldId id="293" r:id="rId8"/>
     <p:sldId id="294" r:id="rId9"/>
-    <p:sldId id="295" r:id="rId10"/>
-    <p:sldId id="296" r:id="rId11"/>
-    <p:sldId id="297" r:id="rId12"/>
-    <p:sldId id="298" r:id="rId13"/>
-    <p:sldId id="299" r:id="rId14"/>
-    <p:sldId id="300" r:id="rId15"/>
-    <p:sldId id="301" r:id="rId16"/>
-    <p:sldId id="303" r:id="rId17"/>
-    <p:sldId id="302" r:id="rId18"/>
-    <p:sldId id="304" r:id="rId19"/>
-    <p:sldId id="305" r:id="rId20"/>
-    <p:sldId id="306" r:id="rId21"/>
-    <p:sldId id="307" r:id="rId22"/>
-    <p:sldId id="308" r:id="rId23"/>
-    <p:sldId id="309" r:id="rId24"/>
-    <p:sldId id="284" r:id="rId25"/>
+    <p:sldId id="296" r:id="rId10"/>
+    <p:sldId id="297" r:id="rId11"/>
+    <p:sldId id="298" r:id="rId12"/>
+    <p:sldId id="299" r:id="rId13"/>
+    <p:sldId id="300" r:id="rId14"/>
+    <p:sldId id="301" r:id="rId15"/>
+    <p:sldId id="303" r:id="rId16"/>
+    <p:sldId id="302" r:id="rId17"/>
+    <p:sldId id="304" r:id="rId18"/>
+    <p:sldId id="305" r:id="rId19"/>
+    <p:sldId id="306" r:id="rId20"/>
+    <p:sldId id="307" r:id="rId21"/>
+    <p:sldId id="308" r:id="rId22"/>
+    <p:sldId id="309" r:id="rId23"/>
+    <p:sldId id="284" r:id="rId24"/>
   </p:sldIdLst>
   <p:sldSz cx="12192000" cy="6858000"/>
   <p:notesSz cx="6858000" cy="9144000"/>
@@ -3026,7 +3025,7 @@
                 <a:cs typeface="Arial" panose="020B0604020202020204" pitchFamily="34" charset="0"/>
                 <a:sym typeface="+mn-lt"/>
               </a:rPr>
-              <a:t>Thiết kế xử </a:t>
+              <a:t>Thiết kế giao </a:t>
             </a:r>
             <a:r>
               <a:rPr lang="vi-VN" altLang="en-US" sz="2400" b="1" dirty="0">
@@ -3035,7 +3034,7 @@
                 <a:cs typeface="Arial" panose="020B0604020202020204" pitchFamily="34" charset="0"/>
                 <a:sym typeface="+mn-lt"/>
               </a:rPr>
-              <a:t>lý</a:t>
+              <a:t>diện</a:t>
             </a:r>
             <a:endParaRPr lang="vi-VN" altLang="en-US" sz="2400" b="1" dirty="0">
               <a:latin typeface="Arial" panose="020B0604020202020204" pitchFamily="34" charset="0"/>
@@ -3048,36 +3047,67 @@
       </p:sp>
       <p:pic>
         <p:nvPicPr>
-          <p:cNvPr id="26" name="Picture 26"/>
+          <p:cNvPr id="30" name="Picture 30"/>
           <p:cNvPicPr/>
           <p:nvPr/>
         </p:nvPicPr>
         <p:blipFill rotWithShape="1">
           <a:blip r:embed="rId2"/>
-          <a:srcRect l="4856"/>
+          <a:srcRect t="2541" b="2060"/>
           <a:stretch>
             <a:fillRect/>
           </a:stretch>
         </p:blipFill>
         <p:spPr bwMode="auto">
           <a:xfrm>
-            <a:off x="1956435" y="1994535"/>
-            <a:ext cx="8505825" cy="4111625"/>
+            <a:off x="2563495" y="1994535"/>
+            <a:ext cx="7065010" cy="3874135"/>
           </a:xfrm>
           <a:prstGeom prst="rect">
             <a:avLst/>
           </a:prstGeom>
-          <a:ln w="9525" cap="flat" cmpd="sng" algn="ctr">
-            <a:solidFill>
-              <a:sysClr val="window" lastClr="FFFFFF"/>
-            </a:solidFill>
-            <a:prstDash val="solid"/>
-            <a:round/>
-            <a:headEnd type="none" w="med" len="med"/>
-            <a:tailEnd type="none" w="med" len="med"/>
+          <a:ln>
+            <a:noFill/>
           </a:ln>
         </p:spPr>
       </p:pic>
+      <p:sp>
+        <p:nvSpPr>
+          <p:cNvPr id="2" name="Text Box 1"/>
+          <p:cNvSpPr txBox="1"/>
+          <p:nvPr/>
+        </p:nvSpPr>
+        <p:spPr>
+          <a:xfrm>
+            <a:off x="4312285" y="6201410"/>
+            <a:ext cx="4175760" cy="368300"/>
+          </a:xfrm>
+          <a:prstGeom prst="rect">
+            <a:avLst/>
+          </a:prstGeom>
+          <a:noFill/>
+        </p:spPr>
+        <p:txBody>
+          <a:bodyPr wrap="square" rtlCol="0">
+            <a:spAutoFit/>
+          </a:bodyPr>
+          <a:p>
+            <a:r>
+              <a:rPr lang="vi-VN" altLang="en-US"/>
+              <a:t>Tổng quan cấu </a:t>
+            </a:r>
+            <a:r>
+              <a:rPr lang="vi-VN" altLang="en-US"/>
+              <a:t>trúc giao diện hệ </a:t>
+            </a:r>
+            <a:r>
+              <a:rPr lang="vi-VN" altLang="en-US"/>
+              <a:t>thống</a:t>
+            </a:r>
+            <a:endParaRPr lang="vi-VN" altLang="en-US"/>
+          </a:p>
+        </p:txBody>
+      </p:sp>
     </p:spTree>
   </p:cSld>
   <p:clrMapOvr>
@@ -3302,333 +3332,6 @@
                 <a:ea typeface="Microsoft YaHei" panose="020B0503020204020204" pitchFamily="34" charset="-122"/>
                 <a:cs typeface="Arial" panose="020B0604020202020204" pitchFamily="34" charset="0"/>
               </a:rPr>
-              <a:t>Chương 3. Hiện thực hóa nghiên </a:t>
-            </a:r>
-            <a:r>
-              <a:rPr lang="vi-VN" altLang="en-US" sz="2400" b="1" dirty="0">
-                <a:solidFill>
-                  <a:schemeClr val="bg1"/>
-                </a:solidFill>
-                <a:latin typeface="Arial" panose="020B0604020202020204" pitchFamily="34" charset="0"/>
-                <a:ea typeface="Microsoft YaHei" panose="020B0503020204020204" pitchFamily="34" charset="-122"/>
-                <a:cs typeface="Arial" panose="020B0604020202020204" pitchFamily="34" charset="0"/>
-              </a:rPr>
-              <a:t>cứu</a:t>
-            </a:r>
-            <a:endParaRPr lang="vi-VN" altLang="en-US" sz="2400" b="1" dirty="0">
-              <a:solidFill>
-                <a:schemeClr val="bg1"/>
-              </a:solidFill>
-              <a:latin typeface="Arial" panose="020B0604020202020204" pitchFamily="34" charset="0"/>
-              <a:ea typeface="Microsoft YaHei" panose="020B0503020204020204" pitchFamily="34" charset="-122"/>
-              <a:cs typeface="Arial" panose="020B0604020202020204" pitchFamily="34" charset="0"/>
-            </a:endParaRPr>
-          </a:p>
-        </p:txBody>
-      </p:sp>
-      <p:sp>
-        <p:nvSpPr>
-          <p:cNvPr id="41" name="Flying impression design ——飞印象设计是一家专业的广告设计制作工作室，专注于平面、OFFICE、摄影等业务，工作室成立于2016年，拥有高水平的设计团队，已经立足于市场，今后将输出更多精致作品。"/>
-          <p:cNvSpPr txBox="1"/>
-          <p:nvPr>
-            <p:custDataLst>
-              <p:tags r:id="rId1"/>
-            </p:custDataLst>
-          </p:nvPr>
-        </p:nvSpPr>
-        <p:spPr>
-          <a:xfrm>
-            <a:off x="927100" y="1534160"/>
-            <a:ext cx="4757420" cy="460375"/>
-          </a:xfrm>
-          <a:prstGeom prst="rect">
-            <a:avLst/>
-          </a:prstGeom>
-          <a:noFill/>
-        </p:spPr>
-        <p:txBody>
-          <a:bodyPr wrap="square" rtlCol="0">
-            <a:spAutoFit/>
-          </a:bodyPr>
-          <a:lstStyle/>
-          <a:p>
-            <a:r>
-              <a:rPr lang="vi-VN" altLang="en-US" sz="2400" b="1" dirty="0">
-                <a:latin typeface="Arial" panose="020B0604020202020204" pitchFamily="34" charset="0"/>
-                <a:ea typeface="Microsoft YaHei" panose="020B0503020204020204" pitchFamily="34" charset="-122"/>
-                <a:cs typeface="Arial" panose="020B0604020202020204" pitchFamily="34" charset="0"/>
-                <a:sym typeface="+mn-lt"/>
-              </a:rPr>
-              <a:t>Thiết kế giao </a:t>
-            </a:r>
-            <a:r>
-              <a:rPr lang="vi-VN" altLang="en-US" sz="2400" b="1" dirty="0">
-                <a:latin typeface="Arial" panose="020B0604020202020204" pitchFamily="34" charset="0"/>
-                <a:ea typeface="Microsoft YaHei" panose="020B0503020204020204" pitchFamily="34" charset="-122"/>
-                <a:cs typeface="Arial" panose="020B0604020202020204" pitchFamily="34" charset="0"/>
-                <a:sym typeface="+mn-lt"/>
-              </a:rPr>
-              <a:t>diện</a:t>
-            </a:r>
-            <a:endParaRPr lang="vi-VN" altLang="en-US" sz="2400" b="1" dirty="0">
-              <a:latin typeface="Arial" panose="020B0604020202020204" pitchFamily="34" charset="0"/>
-              <a:ea typeface="Microsoft YaHei" panose="020B0503020204020204" pitchFamily="34" charset="-122"/>
-              <a:cs typeface="Arial" panose="020B0604020202020204" pitchFamily="34" charset="0"/>
-              <a:sym typeface="+mn-lt"/>
-            </a:endParaRPr>
-          </a:p>
-        </p:txBody>
-      </p:sp>
-      <p:pic>
-        <p:nvPicPr>
-          <p:cNvPr id="30" name="Picture 30"/>
-          <p:cNvPicPr/>
-          <p:nvPr/>
-        </p:nvPicPr>
-        <p:blipFill rotWithShape="1">
-          <a:blip r:embed="rId2"/>
-          <a:srcRect t="2541" b="2060"/>
-          <a:stretch>
-            <a:fillRect/>
-          </a:stretch>
-        </p:blipFill>
-        <p:spPr bwMode="auto">
-          <a:xfrm>
-            <a:off x="2279015" y="2061845"/>
-            <a:ext cx="7633335" cy="4269105"/>
-          </a:xfrm>
-          <a:prstGeom prst="rect">
-            <a:avLst/>
-          </a:prstGeom>
-          <a:ln>
-            <a:noFill/>
-          </a:ln>
-        </p:spPr>
-      </p:pic>
-    </p:spTree>
-  </p:cSld>
-  <p:clrMapOvr>
-    <a:masterClrMapping/>
-  </p:clrMapOvr>
-  <mc:AlternateContent xmlns:mc="http://schemas.openxmlformats.org/markup-compatibility/2006">
-    <mc:Choice xmlns:p14="http://schemas.microsoft.com/office/powerpoint/2010/main" Requires="p14">
-      <p:transition spd="med" p14:dur="699">
-        <p:fade/>
-      </p:transition>
-    </mc:Choice>
-    <mc:Fallback>
-      <p:transition spd="med">
-        <p:fade/>
-      </p:transition>
-    </mc:Fallback>
-  </mc:AlternateContent>
-</p:sld>
-</file>
-
-<file path=ppt/slides/slide12.xml><?xml version="1.0" encoding="utf-8"?>
-<p:sld xmlns:a="http://schemas.openxmlformats.org/drawingml/2006/main" xmlns:r="http://schemas.openxmlformats.org/officeDocument/2006/relationships" xmlns:p="http://schemas.openxmlformats.org/presentationml/2006/main">
-  <p:cSld>
-    <p:spTree>
-      <p:nvGrpSpPr>
-        <p:cNvPr id="1" name=""/>
-        <p:cNvGrpSpPr/>
-        <p:nvPr/>
-      </p:nvGrpSpPr>
-      <p:grpSpPr>
-        <a:xfrm>
-          <a:off x="0" y="0"/>
-          <a:ext cx="0" cy="0"/>
-          <a:chOff x="0" y="0"/>
-          <a:chExt cx="0" cy="0"/>
-        </a:xfrm>
-      </p:grpSpPr>
-      <p:sp>
-        <p:nvSpPr>
-          <p:cNvPr id="34" name="Flying impression design ——飞印象设计是一家专业的广告设计制作工作室，专注于平面、OFFICE、摄影等业务，工作室成立于2016年，拥有高水平的设计团队，已经立足于市场，今后将输出更多精致作品。"/>
-          <p:cNvSpPr/>
-          <p:nvPr/>
-        </p:nvSpPr>
-        <p:spPr>
-          <a:xfrm>
-            <a:off x="0" y="356235"/>
-            <a:ext cx="6721475" cy="791845"/>
-          </a:xfrm>
-          <a:custGeom>
-            <a:avLst/>
-            <a:gdLst>
-              <a:gd name="connsiteX0" fmla="*/ 3825076 w 4547934"/>
-              <a:gd name="connsiteY0" fmla="*/ 0 h 792109"/>
-              <a:gd name="connsiteX1" fmla="*/ 4252413 w 4547934"/>
-              <a:gd name="connsiteY1" fmla="*/ 0 h 792109"/>
-              <a:gd name="connsiteX2" fmla="*/ 4547934 w 4547934"/>
-              <a:gd name="connsiteY2" fmla="*/ 295521 h 792109"/>
-              <a:gd name="connsiteX3" fmla="*/ 4051347 w 4547934"/>
-              <a:gd name="connsiteY3" fmla="*/ 792108 h 792109"/>
-              <a:gd name="connsiteX4" fmla="*/ 3938334 w 4547934"/>
-              <a:gd name="connsiteY4" fmla="*/ 792108 h 792109"/>
-              <a:gd name="connsiteX5" fmla="*/ 3938334 w 4547934"/>
-              <a:gd name="connsiteY5" fmla="*/ 792109 h 792109"/>
-              <a:gd name="connsiteX6" fmla="*/ 0 w 4547934"/>
-              <a:gd name="connsiteY6" fmla="*/ 792109 h 792109"/>
-              <a:gd name="connsiteX7" fmla="*/ 0 w 4547934"/>
-              <a:gd name="connsiteY7" fmla="*/ 1 h 792109"/>
-              <a:gd name="connsiteX8" fmla="*/ 3825077 w 4547934"/>
-              <a:gd name="connsiteY8" fmla="*/ 1 h 792109"/>
-              <a:gd name="connsiteX9" fmla="*/ 3825076 w 4547934"/>
-              <a:gd name="connsiteY9" fmla="*/ 0 h 792109"/>
-            </a:gdLst>
-            <a:ahLst/>
-            <a:cxnLst>
-              <a:cxn ang="0">
-                <a:pos x="connsiteX0" y="connsiteY0"/>
-              </a:cxn>
-              <a:cxn ang="0">
-                <a:pos x="connsiteX1" y="connsiteY1"/>
-              </a:cxn>
-              <a:cxn ang="0">
-                <a:pos x="connsiteX2" y="connsiteY2"/>
-              </a:cxn>
-              <a:cxn ang="0">
-                <a:pos x="connsiteX3" y="connsiteY3"/>
-              </a:cxn>
-              <a:cxn ang="0">
-                <a:pos x="connsiteX4" y="connsiteY4"/>
-              </a:cxn>
-              <a:cxn ang="0">
-                <a:pos x="connsiteX5" y="connsiteY5"/>
-              </a:cxn>
-              <a:cxn ang="0">
-                <a:pos x="connsiteX6" y="connsiteY6"/>
-              </a:cxn>
-              <a:cxn ang="0">
-                <a:pos x="connsiteX7" y="connsiteY7"/>
-              </a:cxn>
-              <a:cxn ang="0">
-                <a:pos x="connsiteX8" y="connsiteY8"/>
-              </a:cxn>
-              <a:cxn ang="0">
-                <a:pos x="connsiteX9" y="connsiteY9"/>
-              </a:cxn>
-            </a:cxnLst>
-            <a:rect l="l" t="t" r="r" b="b"/>
-            <a:pathLst>
-              <a:path w="4547934" h="792109">
-                <a:moveTo>
-                  <a:pt x="3825076" y="0"/>
-                </a:moveTo>
-                <a:lnTo>
-                  <a:pt x="4252413" y="0"/>
-                </a:lnTo>
-                <a:lnTo>
-                  <a:pt x="4547934" y="295521"/>
-                </a:lnTo>
-                <a:lnTo>
-                  <a:pt x="4051347" y="792108"/>
-                </a:lnTo>
-                <a:lnTo>
-                  <a:pt x="3938334" y="792108"/>
-                </a:lnTo>
-                <a:lnTo>
-                  <a:pt x="3938334" y="792109"/>
-                </a:lnTo>
-                <a:lnTo>
-                  <a:pt x="0" y="792109"/>
-                </a:lnTo>
-                <a:lnTo>
-                  <a:pt x="0" y="1"/>
-                </a:lnTo>
-                <a:lnTo>
-                  <a:pt x="3825077" y="1"/>
-                </a:lnTo>
-                <a:lnTo>
-                  <a:pt x="3825076" y="0"/>
-                </a:lnTo>
-                <a:close/>
-              </a:path>
-            </a:pathLst>
-          </a:custGeom>
-          <a:gradFill>
-            <a:gsLst>
-              <a:gs pos="0">
-                <a:srgbClr val="8C1302"/>
-              </a:gs>
-              <a:gs pos="100000">
-                <a:srgbClr val="DE2511"/>
-              </a:gs>
-            </a:gsLst>
-            <a:lin ang="0" scaled="0"/>
-          </a:gradFill>
-          <a:ln>
-            <a:noFill/>
-          </a:ln>
-        </p:spPr>
-        <p:style>
-          <a:lnRef idx="2">
-            <a:schemeClr val="accent1">
-              <a:shade val="50000"/>
-            </a:schemeClr>
-          </a:lnRef>
-          <a:fillRef idx="1">
-            <a:schemeClr val="accent1"/>
-          </a:fillRef>
-          <a:effectRef idx="0">
-            <a:schemeClr val="accent1"/>
-          </a:effectRef>
-          <a:fontRef idx="minor">
-            <a:schemeClr val="lt1"/>
-          </a:fontRef>
-        </p:style>
-        <p:txBody>
-          <a:bodyPr rtlCol="0" anchor="ctr"/>
-          <a:lstStyle/>
-          <a:p>
-            <a:pPr algn="ctr"/>
-            <a:endParaRPr lang="zh-CN" altLang="en-US">
-              <a:latin typeface="Arial" panose="020B0604020202020204" pitchFamily="34" charset="0"/>
-              <a:cs typeface="Arial" panose="020B0604020202020204" pitchFamily="34" charset="0"/>
-            </a:endParaRPr>
-          </a:p>
-        </p:txBody>
-      </p:sp>
-      <p:sp>
-        <p:nvSpPr>
-          <p:cNvPr id="21" name="Flying impression design ——飞印象设计是一家专业的广告设计制作工作室，专注于平面、OFFICE、摄影等业务，工作室成立于2016年，拥有高水平的设计团队，已经立足于市场，今后将输出更多精致作品。"/>
-          <p:cNvSpPr txBox="1"/>
-          <p:nvPr/>
-        </p:nvSpPr>
-        <p:spPr>
-          <a:xfrm>
-            <a:off x="452755" y="466725"/>
-            <a:ext cx="6268720" cy="570865"/>
-          </a:xfrm>
-          <a:prstGeom prst="rect">
-            <a:avLst/>
-          </a:prstGeom>
-          <a:noFill/>
-          <a:ln>
-            <a:noFill/>
-          </a:ln>
-        </p:spPr>
-        <p:txBody>
-          <a:bodyPr wrap="square" rtlCol="0">
-            <a:spAutoFit/>
-          </a:bodyPr>
-          <a:lstStyle/>
-          <a:p>
-            <a:pPr>
-              <a:lnSpc>
-                <a:spcPct val="130000"/>
-              </a:lnSpc>
-            </a:pPr>
-            <a:r>
-              <a:rPr lang="vi-VN" altLang="en-US" sz="2400" b="1" dirty="0">
-                <a:solidFill>
-                  <a:schemeClr val="bg1"/>
-                </a:solidFill>
-                <a:latin typeface="Arial" panose="020B0604020202020204" pitchFamily="34" charset="0"/>
-                <a:ea typeface="Microsoft YaHei" panose="020B0503020204020204" pitchFamily="34" charset="-122"/>
-                <a:cs typeface="Arial" panose="020B0604020202020204" pitchFamily="34" charset="0"/>
-              </a:rPr>
               <a:t>Chương 4. Kết quả nghiên </a:t>
             </a:r>
             <a:r>
@@ -3778,7 +3481,7 @@
 </p:sld>
 </file>
 
-<file path=ppt/slides/slide13.xml><?xml version="1.0" encoding="utf-8"?>
+<file path=ppt/slides/slide12.xml><?xml version="1.0" encoding="utf-8"?>
 <p:sld xmlns:a="http://schemas.openxmlformats.org/drawingml/2006/main" xmlns:r="http://schemas.openxmlformats.org/officeDocument/2006/relationships" xmlns:p="http://schemas.openxmlformats.org/presentationml/2006/main">
   <p:cSld>
     <p:spTree>
@@ -4143,7 +3846,7 @@
 </p:sld>
 </file>
 
-<file path=ppt/slides/slide14.xml><?xml version="1.0" encoding="utf-8"?>
+<file path=ppt/slides/slide13.xml><?xml version="1.0" encoding="utf-8"?>
 <p:sld xmlns:a="http://schemas.openxmlformats.org/drawingml/2006/main" xmlns:r="http://schemas.openxmlformats.org/officeDocument/2006/relationships" xmlns:p="http://schemas.openxmlformats.org/presentationml/2006/main">
   <p:cSld>
     <p:spTree>
@@ -4508,6 +4211,339 @@
 </p:sld>
 </file>
 
+<file path=ppt/slides/slide14.xml><?xml version="1.0" encoding="utf-8"?>
+<p:sld xmlns:a="http://schemas.openxmlformats.org/drawingml/2006/main" xmlns:r="http://schemas.openxmlformats.org/officeDocument/2006/relationships" xmlns:p="http://schemas.openxmlformats.org/presentationml/2006/main">
+  <p:cSld>
+    <p:spTree>
+      <p:nvGrpSpPr>
+        <p:cNvPr id="1" name=""/>
+        <p:cNvGrpSpPr/>
+        <p:nvPr/>
+      </p:nvGrpSpPr>
+      <p:grpSpPr>
+        <a:xfrm>
+          <a:off x="0" y="0"/>
+          <a:ext cx="0" cy="0"/>
+          <a:chOff x="0" y="0"/>
+          <a:chExt cx="0" cy="0"/>
+        </a:xfrm>
+      </p:grpSpPr>
+      <p:sp>
+        <p:nvSpPr>
+          <p:cNvPr id="34" name="Flying impression design ——飞印象设计是一家专业的广告设计制作工作室，专注于平面、OFFICE、摄影等业务，工作室成立于2016年，拥有高水平的设计团队，已经立足于市场，今后将输出更多精致作品。"/>
+          <p:cNvSpPr/>
+          <p:nvPr/>
+        </p:nvSpPr>
+        <p:spPr>
+          <a:xfrm>
+            <a:off x="0" y="356235"/>
+            <a:ext cx="6721475" cy="791845"/>
+          </a:xfrm>
+          <a:custGeom>
+            <a:avLst/>
+            <a:gdLst>
+              <a:gd name="connsiteX0" fmla="*/ 3825076 w 4547934"/>
+              <a:gd name="connsiteY0" fmla="*/ 0 h 792109"/>
+              <a:gd name="connsiteX1" fmla="*/ 4252413 w 4547934"/>
+              <a:gd name="connsiteY1" fmla="*/ 0 h 792109"/>
+              <a:gd name="connsiteX2" fmla="*/ 4547934 w 4547934"/>
+              <a:gd name="connsiteY2" fmla="*/ 295521 h 792109"/>
+              <a:gd name="connsiteX3" fmla="*/ 4051347 w 4547934"/>
+              <a:gd name="connsiteY3" fmla="*/ 792108 h 792109"/>
+              <a:gd name="connsiteX4" fmla="*/ 3938334 w 4547934"/>
+              <a:gd name="connsiteY4" fmla="*/ 792108 h 792109"/>
+              <a:gd name="connsiteX5" fmla="*/ 3938334 w 4547934"/>
+              <a:gd name="connsiteY5" fmla="*/ 792109 h 792109"/>
+              <a:gd name="connsiteX6" fmla="*/ 0 w 4547934"/>
+              <a:gd name="connsiteY6" fmla="*/ 792109 h 792109"/>
+              <a:gd name="connsiteX7" fmla="*/ 0 w 4547934"/>
+              <a:gd name="connsiteY7" fmla="*/ 1 h 792109"/>
+              <a:gd name="connsiteX8" fmla="*/ 3825077 w 4547934"/>
+              <a:gd name="connsiteY8" fmla="*/ 1 h 792109"/>
+              <a:gd name="connsiteX9" fmla="*/ 3825076 w 4547934"/>
+              <a:gd name="connsiteY9" fmla="*/ 0 h 792109"/>
+            </a:gdLst>
+            <a:ahLst/>
+            <a:cxnLst>
+              <a:cxn ang="0">
+                <a:pos x="connsiteX0" y="connsiteY0"/>
+              </a:cxn>
+              <a:cxn ang="0">
+                <a:pos x="connsiteX1" y="connsiteY1"/>
+              </a:cxn>
+              <a:cxn ang="0">
+                <a:pos x="connsiteX2" y="connsiteY2"/>
+              </a:cxn>
+              <a:cxn ang="0">
+                <a:pos x="connsiteX3" y="connsiteY3"/>
+              </a:cxn>
+              <a:cxn ang="0">
+                <a:pos x="connsiteX4" y="connsiteY4"/>
+              </a:cxn>
+              <a:cxn ang="0">
+                <a:pos x="connsiteX5" y="connsiteY5"/>
+              </a:cxn>
+              <a:cxn ang="0">
+                <a:pos x="connsiteX6" y="connsiteY6"/>
+              </a:cxn>
+              <a:cxn ang="0">
+                <a:pos x="connsiteX7" y="connsiteY7"/>
+              </a:cxn>
+              <a:cxn ang="0">
+                <a:pos x="connsiteX8" y="connsiteY8"/>
+              </a:cxn>
+              <a:cxn ang="0">
+                <a:pos x="connsiteX9" y="connsiteY9"/>
+              </a:cxn>
+            </a:cxnLst>
+            <a:rect l="l" t="t" r="r" b="b"/>
+            <a:pathLst>
+              <a:path w="4547934" h="792109">
+                <a:moveTo>
+                  <a:pt x="3825076" y="0"/>
+                </a:moveTo>
+                <a:lnTo>
+                  <a:pt x="4252413" y="0"/>
+                </a:lnTo>
+                <a:lnTo>
+                  <a:pt x="4547934" y="295521"/>
+                </a:lnTo>
+                <a:lnTo>
+                  <a:pt x="4051347" y="792108"/>
+                </a:lnTo>
+                <a:lnTo>
+                  <a:pt x="3938334" y="792108"/>
+                </a:lnTo>
+                <a:lnTo>
+                  <a:pt x="3938334" y="792109"/>
+                </a:lnTo>
+                <a:lnTo>
+                  <a:pt x="0" y="792109"/>
+                </a:lnTo>
+                <a:lnTo>
+                  <a:pt x="0" y="1"/>
+                </a:lnTo>
+                <a:lnTo>
+                  <a:pt x="3825077" y="1"/>
+                </a:lnTo>
+                <a:lnTo>
+                  <a:pt x="3825076" y="0"/>
+                </a:lnTo>
+                <a:close/>
+              </a:path>
+            </a:pathLst>
+          </a:custGeom>
+          <a:gradFill>
+            <a:gsLst>
+              <a:gs pos="0">
+                <a:srgbClr val="8C1302"/>
+              </a:gs>
+              <a:gs pos="100000">
+                <a:srgbClr val="DE2511"/>
+              </a:gs>
+            </a:gsLst>
+            <a:lin ang="0" scaled="0"/>
+          </a:gradFill>
+          <a:ln>
+            <a:noFill/>
+          </a:ln>
+        </p:spPr>
+        <p:style>
+          <a:lnRef idx="2">
+            <a:schemeClr val="accent1">
+              <a:shade val="50000"/>
+            </a:schemeClr>
+          </a:lnRef>
+          <a:fillRef idx="1">
+            <a:schemeClr val="accent1"/>
+          </a:fillRef>
+          <a:effectRef idx="0">
+            <a:schemeClr val="accent1"/>
+          </a:effectRef>
+          <a:fontRef idx="minor">
+            <a:schemeClr val="lt1"/>
+          </a:fontRef>
+        </p:style>
+        <p:txBody>
+          <a:bodyPr rtlCol="0" anchor="ctr"/>
+          <a:lstStyle/>
+          <a:p>
+            <a:pPr algn="ctr"/>
+            <a:endParaRPr lang="zh-CN" altLang="en-US">
+              <a:latin typeface="Arial" panose="020B0604020202020204" pitchFamily="34" charset="0"/>
+              <a:cs typeface="Arial" panose="020B0604020202020204" pitchFamily="34" charset="0"/>
+            </a:endParaRPr>
+          </a:p>
+        </p:txBody>
+      </p:sp>
+      <p:sp>
+        <p:nvSpPr>
+          <p:cNvPr id="21" name="Flying impression design ——飞印象设计是一家专业的广告设计制作工作室，专注于平面、OFFICE、摄影等业务，工作室成立于2016年，拥有高水平的设计团队，已经立足于市场，今后将输出更多精致作品。"/>
+          <p:cNvSpPr txBox="1"/>
+          <p:nvPr/>
+        </p:nvSpPr>
+        <p:spPr>
+          <a:xfrm>
+            <a:off x="452755" y="466725"/>
+            <a:ext cx="6268720" cy="570865"/>
+          </a:xfrm>
+          <a:prstGeom prst="rect">
+            <a:avLst/>
+          </a:prstGeom>
+          <a:noFill/>
+          <a:ln>
+            <a:noFill/>
+          </a:ln>
+        </p:spPr>
+        <p:txBody>
+          <a:bodyPr wrap="square" rtlCol="0">
+            <a:spAutoFit/>
+          </a:bodyPr>
+          <a:lstStyle/>
+          <a:p>
+            <a:pPr>
+              <a:lnSpc>
+                <a:spcPct val="130000"/>
+              </a:lnSpc>
+            </a:pPr>
+            <a:r>
+              <a:rPr lang="vi-VN" altLang="en-US" sz="2400" b="1" dirty="0">
+                <a:solidFill>
+                  <a:schemeClr val="bg1"/>
+                </a:solidFill>
+                <a:latin typeface="Arial" panose="020B0604020202020204" pitchFamily="34" charset="0"/>
+                <a:ea typeface="Microsoft YaHei" panose="020B0503020204020204" pitchFamily="34" charset="-122"/>
+                <a:cs typeface="Arial" panose="020B0604020202020204" pitchFamily="34" charset="0"/>
+              </a:rPr>
+              <a:t>Chương 4. Kết quả nghiên </a:t>
+            </a:r>
+            <a:r>
+              <a:rPr lang="vi-VN" altLang="en-US" sz="2400" b="1" dirty="0">
+                <a:solidFill>
+                  <a:schemeClr val="bg1"/>
+                </a:solidFill>
+                <a:latin typeface="Arial" panose="020B0604020202020204" pitchFamily="34" charset="0"/>
+                <a:ea typeface="Microsoft YaHei" panose="020B0503020204020204" pitchFamily="34" charset="-122"/>
+                <a:cs typeface="Arial" panose="020B0604020202020204" pitchFamily="34" charset="0"/>
+              </a:rPr>
+              <a:t>cứu</a:t>
+            </a:r>
+            <a:endParaRPr lang="vi-VN" altLang="en-US" sz="2400" b="1" dirty="0">
+              <a:solidFill>
+                <a:schemeClr val="bg1"/>
+              </a:solidFill>
+              <a:latin typeface="Arial" panose="020B0604020202020204" pitchFamily="34" charset="0"/>
+              <a:ea typeface="Microsoft YaHei" panose="020B0503020204020204" pitchFamily="34" charset="-122"/>
+              <a:cs typeface="Arial" panose="020B0604020202020204" pitchFamily="34" charset="0"/>
+            </a:endParaRPr>
+          </a:p>
+        </p:txBody>
+      </p:sp>
+      <p:sp>
+        <p:nvSpPr>
+          <p:cNvPr id="41" name="Flying impression design ——飞印象设计是一家专业的广告设计制作工作室，专注于平面、OFFICE、摄影等业务，工作室成立于2016年，拥有高水平的设计团队，已经立足于市场，今后将输出更多精致作品。"/>
+          <p:cNvSpPr txBox="1"/>
+          <p:nvPr>
+            <p:custDataLst>
+              <p:tags r:id="rId1"/>
+            </p:custDataLst>
+          </p:nvPr>
+        </p:nvSpPr>
+        <p:spPr>
+          <a:xfrm>
+            <a:off x="927100" y="1283970"/>
+            <a:ext cx="6383655" cy="460375"/>
+          </a:xfrm>
+          <a:prstGeom prst="rect">
+            <a:avLst/>
+          </a:prstGeom>
+          <a:noFill/>
+        </p:spPr>
+        <p:txBody>
+          <a:bodyPr wrap="square" rtlCol="0">
+            <a:spAutoFit/>
+          </a:bodyPr>
+          <a:lstStyle/>
+          <a:p>
+            <a:r>
+              <a:rPr lang="vi-VN" altLang="en-US" sz="2400" b="1" dirty="0">
+                <a:latin typeface="Arial" panose="020B0604020202020204" pitchFamily="34" charset="0"/>
+                <a:ea typeface="Microsoft YaHei" panose="020B0503020204020204" pitchFamily="34" charset="-122"/>
+                <a:cs typeface="Arial" panose="020B0604020202020204" pitchFamily="34" charset="0"/>
+                <a:sym typeface="+mn-lt"/>
+              </a:rPr>
+              <a:t>Giao diện trang chi tiết sản </a:t>
+            </a:r>
+            <a:r>
+              <a:rPr lang="vi-VN" altLang="en-US" sz="2400" b="1" dirty="0">
+                <a:latin typeface="Arial" panose="020B0604020202020204" pitchFamily="34" charset="0"/>
+                <a:ea typeface="Microsoft YaHei" panose="020B0503020204020204" pitchFamily="34" charset="-122"/>
+                <a:cs typeface="Arial" panose="020B0604020202020204" pitchFamily="34" charset="0"/>
+                <a:sym typeface="+mn-lt"/>
+              </a:rPr>
+              <a:t>phẩm</a:t>
+            </a:r>
+            <a:endParaRPr lang="vi-VN" altLang="en-US" sz="2400" b="1" dirty="0">
+              <a:latin typeface="Arial" panose="020B0604020202020204" pitchFamily="34" charset="0"/>
+              <a:ea typeface="Microsoft YaHei" panose="020B0503020204020204" pitchFamily="34" charset="-122"/>
+              <a:cs typeface="Arial" panose="020B0604020202020204" pitchFamily="34" charset="0"/>
+              <a:sym typeface="+mn-lt"/>
+            </a:endParaRPr>
+          </a:p>
+        </p:txBody>
+      </p:sp>
+      <p:pic>
+        <p:nvPicPr>
+          <p:cNvPr id="19" name="Picture 19"/>
+          <p:cNvPicPr/>
+          <p:nvPr/>
+        </p:nvPicPr>
+        <p:blipFill rotWithShape="1">
+          <a:blip r:embed="rId2" cstate="print">
+            <a:extLst>
+              <a:ext uri="{28A0092B-C50C-407E-A947-70E740481C1C}">
+                <a14:useLocalDpi xmlns:a14="http://schemas.microsoft.com/office/drawing/2010/main" val="0"/>
+              </a:ext>
+            </a:extLst>
+          </a:blip>
+          <a:srcRect l="10850" t="6636" r="12829" b="15394"/>
+          <a:stretch>
+            <a:fillRect/>
+          </a:stretch>
+        </p:blipFill>
+        <p:spPr bwMode="auto">
+          <a:xfrm>
+            <a:off x="2439035" y="1744345"/>
+            <a:ext cx="7255510" cy="4874895"/>
+          </a:xfrm>
+          <a:prstGeom prst="rect">
+            <a:avLst/>
+          </a:prstGeom>
+          <a:ln>
+            <a:noFill/>
+          </a:ln>
+        </p:spPr>
+      </p:pic>
+    </p:spTree>
+  </p:cSld>
+  <p:clrMapOvr>
+    <a:masterClrMapping/>
+  </p:clrMapOvr>
+  <mc:AlternateContent xmlns:mc="http://schemas.openxmlformats.org/markup-compatibility/2006">
+    <mc:Choice xmlns:p14="http://schemas.microsoft.com/office/powerpoint/2010/main" Requires="p14">
+      <p:transition spd="med" p14:dur="699">
+        <p:fade/>
+      </p:transition>
+    </mc:Choice>
+    <mc:Fallback>
+      <p:transition spd="med">
+        <p:fade/>
+      </p:transition>
+    </mc:Fallback>
+  </mc:AlternateContent>
+</p:sld>
+</file>
+
 <file path=ppt/slides/slide15.xml><?xml version="1.0" encoding="utf-8"?>
 <p:sld xmlns:a="http://schemas.openxmlformats.org/drawingml/2006/main" xmlns:r="http://schemas.openxmlformats.org/officeDocument/2006/relationships" xmlns:p="http://schemas.openxmlformats.org/presentationml/2006/main">
   <p:cSld>
@@ -4748,7 +4784,7 @@
         </p:nvSpPr>
         <p:spPr>
           <a:xfrm>
-            <a:off x="927100" y="1283970"/>
+            <a:off x="927100" y="1238250"/>
             <a:ext cx="6383655" cy="460375"/>
           </a:xfrm>
           <a:prstGeom prst="rect">
@@ -4769,7 +4805,7 @@
                 <a:cs typeface="Arial" panose="020B0604020202020204" pitchFamily="34" charset="0"/>
                 <a:sym typeface="+mn-lt"/>
               </a:rPr>
-              <a:t>Giao diện trang chi tiết sản </a:t>
+              <a:t>Giao diện trang giỏ </a:t>
             </a:r>
             <a:r>
               <a:rPr lang="vi-VN" altLang="en-US" sz="2400" b="1" dirty="0">
@@ -4778,7 +4814,7 @@
                 <a:cs typeface="Arial" panose="020B0604020202020204" pitchFamily="34" charset="0"/>
                 <a:sym typeface="+mn-lt"/>
               </a:rPr>
-              <a:t>phẩm</a:t>
+              <a:t>hàng</a:t>
             </a:r>
             <a:endParaRPr lang="vi-VN" altLang="en-US" sz="2400" b="1" dirty="0">
               <a:latin typeface="Arial" panose="020B0604020202020204" pitchFamily="34" charset="0"/>
@@ -4791,27 +4827,21 @@
       </p:sp>
       <p:pic>
         <p:nvPicPr>
-          <p:cNvPr id="19" name="Picture 19"/>
+          <p:cNvPr id="56" name="Picture 56"/>
           <p:cNvPicPr/>
           <p:nvPr/>
         </p:nvPicPr>
         <p:blipFill rotWithShape="1">
-          <a:blip r:embed="rId2" cstate="print">
-            <a:extLst>
-              <a:ext uri="{28A0092B-C50C-407E-A947-70E740481C1C}">
-                <a14:useLocalDpi xmlns:a14="http://schemas.microsoft.com/office/drawing/2010/main" val="0"/>
-              </a:ext>
-            </a:extLst>
-          </a:blip>
-          <a:srcRect l="10850" t="6636" r="12829" b="15394"/>
+          <a:blip r:embed="rId2"/>
+          <a:srcRect r="911" b="1885"/>
           <a:stretch>
             <a:fillRect/>
           </a:stretch>
         </p:blipFill>
         <p:spPr bwMode="auto">
           <a:xfrm>
-            <a:off x="2439035" y="1744345"/>
-            <a:ext cx="7255510" cy="4874895"/>
+            <a:off x="2228850" y="1788795"/>
+            <a:ext cx="8132445" cy="4503420"/>
           </a:xfrm>
           <a:prstGeom prst="rect">
             <a:avLst/>
@@ -5081,7 +5111,7 @@
         </p:nvSpPr>
         <p:spPr>
           <a:xfrm>
-            <a:off x="927100" y="1238250"/>
+            <a:off x="927100" y="1534160"/>
             <a:ext cx="6383655" cy="460375"/>
           </a:xfrm>
           <a:prstGeom prst="rect">
@@ -5102,7 +5132,7 @@
                 <a:cs typeface="Arial" panose="020B0604020202020204" pitchFamily="34" charset="0"/>
                 <a:sym typeface="+mn-lt"/>
               </a:rPr>
-              <a:t>Giao diện trang giỏ </a:t>
+              <a:t>Giao diện trang đặt </a:t>
             </a:r>
             <a:r>
               <a:rPr lang="vi-VN" altLang="en-US" sz="2400" b="1" dirty="0">
@@ -5124,21 +5154,21 @@
       </p:sp>
       <p:pic>
         <p:nvPicPr>
-          <p:cNvPr id="56" name="Picture 56"/>
+          <p:cNvPr id="60" name="Picture 60"/>
           <p:cNvPicPr/>
           <p:nvPr/>
         </p:nvPicPr>
         <p:blipFill rotWithShape="1">
           <a:blip r:embed="rId2"/>
-          <a:srcRect r="911" b="1885"/>
+          <a:srcRect l="10998" t="12072" r="10292" b="3363"/>
           <a:stretch>
             <a:fillRect/>
           </a:stretch>
         </p:blipFill>
         <p:spPr bwMode="auto">
           <a:xfrm>
-            <a:off x="2228850" y="1788795"/>
-            <a:ext cx="8132445" cy="4503420"/>
+            <a:off x="2167255" y="1994535"/>
+            <a:ext cx="7858125" cy="4634865"/>
           </a:xfrm>
           <a:prstGeom prst="rect">
             <a:avLst/>
@@ -5429,7 +5459,7 @@
                 <a:cs typeface="Arial" panose="020B0604020202020204" pitchFamily="34" charset="0"/>
                 <a:sym typeface="+mn-lt"/>
               </a:rPr>
-              <a:t>Giao diện trang đặt </a:t>
+              <a:t>Giao diện trang đơn </a:t>
             </a:r>
             <a:r>
               <a:rPr lang="vi-VN" altLang="en-US" sz="2400" b="1" dirty="0">
@@ -5451,28 +5481,27 @@
       </p:sp>
       <p:pic>
         <p:nvPicPr>
-          <p:cNvPr id="60" name="Picture 60"/>
-          <p:cNvPicPr/>
+          <p:cNvPr id="2" name="Picture 1"/>
+          <p:cNvPicPr>
+            <a:picLocks noChangeAspect="1"/>
+          </p:cNvPicPr>
           <p:nvPr/>
         </p:nvPicPr>
-        <p:blipFill rotWithShape="1">
+        <p:blipFill>
           <a:blip r:embed="rId2"/>
-          <a:srcRect l="10998" t="12072" r="10292" b="3363"/>
+          <a:srcRect l="1839" t="2195" r="2359"/>
           <a:stretch>
             <a:fillRect/>
           </a:stretch>
         </p:blipFill>
-        <p:spPr bwMode="auto">
+        <p:spPr>
           <a:xfrm>
-            <a:off x="2167255" y="1994535"/>
-            <a:ext cx="7858125" cy="4634865"/>
+            <a:off x="1421130" y="2089785"/>
+            <a:ext cx="9349740" cy="4460875"/>
           </a:xfrm>
           <a:prstGeom prst="rect">
             <a:avLst/>
           </a:prstGeom>
-          <a:ln>
-            <a:noFill/>
-          </a:ln>
         </p:spPr>
       </p:pic>
     </p:spTree>
@@ -5756,7 +5785,7 @@
                 <a:cs typeface="Arial" panose="020B0604020202020204" pitchFamily="34" charset="0"/>
                 <a:sym typeface="+mn-lt"/>
               </a:rPr>
-              <a:t>Giao diện trang đơn </a:t>
+              <a:t>Giao diện trang quản </a:t>
             </a:r>
             <a:r>
               <a:rPr lang="vi-VN" altLang="en-US" sz="2400" b="1" dirty="0">
@@ -5765,7 +5794,7 @@
                 <a:cs typeface="Arial" panose="020B0604020202020204" pitchFamily="34" charset="0"/>
                 <a:sym typeface="+mn-lt"/>
               </a:rPr>
-              <a:t>hàng</a:t>
+              <a:t>trị</a:t>
             </a:r>
             <a:endParaRPr lang="vi-VN" altLang="en-US" sz="2400" b="1" dirty="0">
               <a:latin typeface="Arial" panose="020B0604020202020204" pitchFamily="34" charset="0"/>
@@ -5778,27 +5807,28 @@
       </p:sp>
       <p:pic>
         <p:nvPicPr>
-          <p:cNvPr id="2" name="Picture 1"/>
-          <p:cNvPicPr>
-            <a:picLocks noChangeAspect="1"/>
-          </p:cNvPicPr>
+          <p:cNvPr id="13" name="Picture 13"/>
+          <p:cNvPicPr/>
           <p:nvPr/>
         </p:nvPicPr>
-        <p:blipFill>
+        <p:blipFill rotWithShape="1">
           <a:blip r:embed="rId2"/>
-          <a:srcRect l="1839" t="2195" r="2359"/>
+          <a:srcRect b="28248"/>
           <a:stretch>
             <a:fillRect/>
           </a:stretch>
         </p:blipFill>
-        <p:spPr>
+        <p:spPr bwMode="auto">
           <a:xfrm>
-            <a:off x="1421130" y="2089785"/>
-            <a:ext cx="9349740" cy="4460875"/>
+            <a:off x="2364105" y="1994535"/>
+            <a:ext cx="7898765" cy="3787775"/>
           </a:xfrm>
           <a:prstGeom prst="rect">
             <a:avLst/>
           </a:prstGeom>
+          <a:ln>
+            <a:noFill/>
+          </a:ln>
         </p:spPr>
       </p:pic>
     </p:spTree>
@@ -6082,7 +6112,7 @@
                 <a:cs typeface="Arial" panose="020B0604020202020204" pitchFamily="34" charset="0"/>
                 <a:sym typeface="+mn-lt"/>
               </a:rPr>
-              <a:t>Giao diện trang quản </a:t>
+              <a:t>Giao diện trang quản lý sản </a:t>
             </a:r>
             <a:r>
               <a:rPr lang="vi-VN" altLang="en-US" sz="2400" b="1" dirty="0">
@@ -6091,7 +6121,7 @@
                 <a:cs typeface="Arial" panose="020B0604020202020204" pitchFamily="34" charset="0"/>
                 <a:sym typeface="+mn-lt"/>
               </a:rPr>
-              <a:t>trị</a:t>
+              <a:t>phẩm</a:t>
             </a:r>
             <a:endParaRPr lang="vi-VN" altLang="en-US" sz="2400" b="1" dirty="0">
               <a:latin typeface="Arial" panose="020B0604020202020204" pitchFamily="34" charset="0"/>
@@ -6104,21 +6134,59 @@
       </p:sp>
       <p:pic>
         <p:nvPicPr>
-          <p:cNvPr id="13" name="Picture 13"/>
+          <p:cNvPr id="22" name="Picture 22"/>
           <p:cNvPicPr/>
           <p:nvPr/>
         </p:nvPicPr>
         <p:blipFill rotWithShape="1">
-          <a:blip r:embed="rId2"/>
-          <a:srcRect b="28248"/>
+          <a:blip r:embed="rId2" cstate="print">
+            <a:extLst>
+              <a:ext uri="{28A0092B-C50C-407E-A947-70E740481C1C}">
+                <a14:useLocalDpi xmlns:a14="http://schemas.microsoft.com/office/drawing/2010/main" val="0"/>
+              </a:ext>
+            </a:extLst>
+          </a:blip>
+          <a:srcRect l="11621" t="1663" r="10643" b="47569"/>
           <a:stretch>
             <a:fillRect/>
           </a:stretch>
         </p:blipFill>
         <p:spPr bwMode="auto">
           <a:xfrm>
-            <a:off x="2364105" y="1994535"/>
-            <a:ext cx="7898765" cy="3787775"/>
+            <a:off x="259080" y="2244090"/>
+            <a:ext cx="6020435" cy="3801745"/>
+          </a:xfrm>
+          <a:prstGeom prst="rect">
+            <a:avLst/>
+          </a:prstGeom>
+          <a:ln>
+            <a:noFill/>
+          </a:ln>
+        </p:spPr>
+      </p:pic>
+      <p:pic>
+        <p:nvPicPr>
+          <p:cNvPr id="2" name="Picture 22"/>
+          <p:cNvPicPr/>
+          <p:nvPr/>
+        </p:nvPicPr>
+        <p:blipFill rotWithShape="1">
+          <a:blip r:embed="rId2" cstate="print">
+            <a:extLst>
+              <a:ext uri="{28A0092B-C50C-407E-A947-70E740481C1C}">
+                <a14:useLocalDpi xmlns:a14="http://schemas.microsoft.com/office/drawing/2010/main" val="0"/>
+              </a:ext>
+            </a:extLst>
+          </a:blip>
+          <a:srcRect l="11621" t="50831" r="10643"/>
+          <a:stretch>
+            <a:fillRect/>
+          </a:stretch>
+        </p:blipFill>
+        <p:spPr bwMode="auto">
+          <a:xfrm>
+            <a:off x="6436995" y="2244090"/>
+            <a:ext cx="5590540" cy="3802380"/>
           </a:xfrm>
           <a:prstGeom prst="rect">
             <a:avLst/>
@@ -8501,7 +8569,7 @@
         <p:spPr>
           <a:xfrm>
             <a:off x="0" y="356235"/>
-            <a:ext cx="6721475" cy="791845"/>
+            <a:ext cx="7210425" cy="791845"/>
           </a:xfrm>
           <a:custGeom>
             <a:avLst/>
@@ -8679,7 +8747,7 @@
                 <a:ea typeface="Microsoft YaHei" panose="020B0503020204020204" pitchFamily="34" charset="-122"/>
                 <a:cs typeface="Arial" panose="020B0604020202020204" pitchFamily="34" charset="0"/>
               </a:rPr>
-              <a:t>Chương 4. Kết quả nghiên </a:t>
+              <a:t>Chương 5. Kết luận và hướng phát </a:t>
             </a:r>
             <a:r>
               <a:rPr lang="vi-VN" altLang="en-US" sz="2400" b="1" dirty="0">
@@ -8690,7 +8758,7 @@
                 <a:ea typeface="Microsoft YaHei" panose="020B0503020204020204" pitchFamily="34" charset="-122"/>
                 <a:cs typeface="Arial" panose="020B0604020202020204" pitchFamily="34" charset="0"/>
               </a:rPr>
-              <a:t>cứu</a:t>
+              <a:t>triển</a:t>
             </a:r>
             <a:endParaRPr lang="vi-VN" altLang="en-US" sz="2400" b="1" dirty="0">
               <a:solidFill>
@@ -8736,7 +8804,7 @@
                 <a:cs typeface="Arial" panose="020B0604020202020204" pitchFamily="34" charset="0"/>
                 <a:sym typeface="+mn-lt"/>
               </a:rPr>
-              <a:t>Giao diện trang quản lý sản </a:t>
+              <a:t>Kết </a:t>
             </a:r>
             <a:r>
               <a:rPr lang="vi-VN" altLang="en-US" sz="2400" b="1" dirty="0">
@@ -8745,7 +8813,7 @@
                 <a:cs typeface="Arial" panose="020B0604020202020204" pitchFamily="34" charset="0"/>
                 <a:sym typeface="+mn-lt"/>
               </a:rPr>
-              <a:t>phẩm</a:t>
+              <a:t>luận</a:t>
             </a:r>
             <a:endParaRPr lang="vi-VN" altLang="en-US" sz="2400" b="1" dirty="0">
               <a:latin typeface="Arial" panose="020B0604020202020204" pitchFamily="34" charset="0"/>
@@ -8756,70 +8824,356 @@
           </a:p>
         </p:txBody>
       </p:sp>
-      <p:pic>
-        <p:nvPicPr>
-          <p:cNvPr id="22" name="Picture 22"/>
-          <p:cNvPicPr/>
+      <p:sp>
+        <p:nvSpPr>
+          <p:cNvPr id="2" name="Text Box 1"/>
+          <p:cNvSpPr txBox="1"/>
           <p:nvPr/>
-        </p:nvPicPr>
-        <p:blipFill rotWithShape="1">
-          <a:blip r:embed="rId2" cstate="print">
-            <a:extLst>
-              <a:ext uri="{28A0092B-C50C-407E-A947-70E740481C1C}">
-                <a14:useLocalDpi xmlns:a14="http://schemas.microsoft.com/office/drawing/2010/main" val="0"/>
-              </a:ext>
-            </a:extLst>
-          </a:blip>
-          <a:srcRect l="11621" t="1663" r="10643" b="47569"/>
-          <a:stretch>
-            <a:fillRect/>
-          </a:stretch>
-        </p:blipFill>
-        <p:spPr bwMode="auto">
+        </p:nvSpPr>
+        <p:spPr>
           <a:xfrm>
-            <a:off x="259080" y="2244090"/>
-            <a:ext cx="6020435" cy="3801745"/>
+            <a:off x="1233170" y="2226310"/>
+            <a:ext cx="9609455" cy="4078605"/>
           </a:xfrm>
           <a:prstGeom prst="rect">
             <a:avLst/>
           </a:prstGeom>
-          <a:ln>
-            <a:noFill/>
-          </a:ln>
+          <a:noFill/>
         </p:spPr>
-      </p:pic>
-      <p:pic>
-        <p:nvPicPr>
-          <p:cNvPr id="2" name="Picture 22"/>
-          <p:cNvPicPr/>
-          <p:nvPr/>
-        </p:nvPicPr>
-        <p:blipFill rotWithShape="1">
-          <a:blip r:embed="rId2" cstate="print">
-            <a:extLst>
-              <a:ext uri="{28A0092B-C50C-407E-A947-70E740481C1C}">
-                <a14:useLocalDpi xmlns:a14="http://schemas.microsoft.com/office/drawing/2010/main" val="0"/>
-              </a:ext>
-            </a:extLst>
-          </a:blip>
-          <a:srcRect l="11621" t="50831" r="10643"/>
-          <a:stretch>
-            <a:fillRect/>
-          </a:stretch>
-        </p:blipFill>
-        <p:spPr bwMode="auto">
-          <a:xfrm>
-            <a:off x="6436995" y="2244090"/>
-            <a:ext cx="5590540" cy="3802380"/>
-          </a:xfrm>
-          <a:prstGeom prst="rect">
-            <a:avLst/>
-          </a:prstGeom>
-          <a:ln>
-            <a:noFill/>
-          </a:ln>
-        </p:spPr>
-      </p:pic>
+        <p:txBody>
+          <a:bodyPr wrap="square" rtlCol="0">
+            <a:spAutoFit/>
+          </a:bodyPr>
+          <a:p>
+            <a:pPr algn="just">
+              <a:lnSpc>
+                <a:spcPct val="120000"/>
+              </a:lnSpc>
+            </a:pPr>
+            <a:r>
+              <a:rPr lang="en-US" altLang="en-US" sz="2400" b="1">
+                <a:latin typeface="Arial" panose="020B0604020202020204" pitchFamily="34" charset="0"/>
+                <a:cs typeface="Arial" panose="020B0604020202020204" pitchFamily="34" charset="0"/>
+              </a:rPr>
+              <a:t>Hoàn thiện yêu cầu </a:t>
+            </a:r>
+            <a:r>
+              <a:rPr lang="en-US" altLang="en-US" sz="2400" b="1">
+                <a:latin typeface="Arial" panose="020B0604020202020204" pitchFamily="34" charset="0"/>
+                <a:cs typeface="Arial" panose="020B0604020202020204" pitchFamily="34" charset="0"/>
+              </a:rPr>
+              <a:t>đ</a:t>
+            </a:r>
+            <a:r>
+              <a:rPr lang="en-US" altLang="en-US" sz="2400" b="1">
+                <a:latin typeface="Arial" panose="020B0604020202020204" pitchFamily="34" charset="0"/>
+                <a:cs typeface="Arial" panose="020B0604020202020204" pitchFamily="34" charset="0"/>
+              </a:rPr>
+              <a:t>ề ra</a:t>
+            </a:r>
+            <a:r>
+              <a:rPr lang="en-US" altLang="en-US" sz="2400">
+                <a:latin typeface="Arial" panose="020B0604020202020204" pitchFamily="34" charset="0"/>
+                <a:cs typeface="Arial" panose="020B0604020202020204" pitchFamily="34" charset="0"/>
+              </a:rPr>
+              <a:t>:</a:t>
+            </a:r>
+            <a:endParaRPr lang="en-US" altLang="en-US" sz="2400">
+              <a:latin typeface="Arial" panose="020B0604020202020204" pitchFamily="34" charset="0"/>
+              <a:cs typeface="Arial" panose="020B0604020202020204" pitchFamily="34" charset="0"/>
+            </a:endParaRPr>
+          </a:p>
+          <a:p>
+            <a:pPr algn="just">
+              <a:lnSpc>
+                <a:spcPct val="120000"/>
+              </a:lnSpc>
+            </a:pPr>
+            <a:r>
+              <a:rPr lang="en-US" altLang="en-US" sz="2400">
+                <a:latin typeface="Arial" panose="020B0604020202020204" pitchFamily="34" charset="0"/>
+                <a:cs typeface="Arial" panose="020B0604020202020204" pitchFamily="34" charset="0"/>
+              </a:rPr>
+              <a:t>Website </a:t>
+            </a:r>
+            <a:r>
+              <a:rPr lang="en-US" altLang="en-US" sz="2400">
+                <a:latin typeface="Arial" panose="020B0604020202020204" pitchFamily="34" charset="0"/>
+                <a:cs typeface="Arial" panose="020B0604020202020204" pitchFamily="34" charset="0"/>
+              </a:rPr>
+              <a:t>đ</a:t>
+            </a:r>
+            <a:r>
+              <a:rPr lang="en-US" altLang="en-US" sz="2400">
+                <a:latin typeface="Arial" panose="020B0604020202020204" pitchFamily="34" charset="0"/>
+                <a:cs typeface="Arial" panose="020B0604020202020204" pitchFamily="34" charset="0"/>
+              </a:rPr>
+              <a:t>ã </a:t>
+            </a:r>
+            <a:r>
+              <a:rPr lang="en-US" altLang="en-US" sz="2400">
+                <a:latin typeface="Arial" panose="020B0604020202020204" pitchFamily="34" charset="0"/>
+                <a:cs typeface="Arial" panose="020B0604020202020204" pitchFamily="34" charset="0"/>
+              </a:rPr>
+              <a:t>đ</a:t>
+            </a:r>
+            <a:r>
+              <a:rPr lang="en-US" altLang="en-US" sz="2400">
+                <a:latin typeface="Arial" panose="020B0604020202020204" pitchFamily="34" charset="0"/>
+                <a:cs typeface="Arial" panose="020B0604020202020204" pitchFamily="34" charset="0"/>
+              </a:rPr>
+              <a:t>áp ứng </a:t>
+            </a:r>
+            <a:r>
+              <a:rPr lang="en-US" altLang="en-US" sz="2400">
+                <a:latin typeface="Arial" panose="020B0604020202020204" pitchFamily="34" charset="0"/>
+                <a:cs typeface="Arial" panose="020B0604020202020204" pitchFamily="34" charset="0"/>
+              </a:rPr>
+              <a:t>đư</a:t>
+            </a:r>
+            <a:r>
+              <a:rPr lang="en-US" altLang="en-US" sz="2400">
+                <a:latin typeface="Arial" panose="020B0604020202020204" pitchFamily="34" charset="0"/>
+                <a:cs typeface="Arial" panose="020B0604020202020204" pitchFamily="34" charset="0"/>
+              </a:rPr>
+              <a:t>ợc các yêu cầu về chức n</a:t>
+            </a:r>
+            <a:r>
+              <a:rPr lang="en-US" altLang="en-US" sz="2400">
+                <a:latin typeface="Arial" panose="020B0604020202020204" pitchFamily="34" charset="0"/>
+                <a:cs typeface="Arial" panose="020B0604020202020204" pitchFamily="34" charset="0"/>
+              </a:rPr>
+              <a:t>ă</a:t>
+            </a:r>
+            <a:r>
+              <a:rPr lang="en-US" altLang="en-US" sz="2400">
+                <a:latin typeface="Arial" panose="020B0604020202020204" pitchFamily="34" charset="0"/>
+                <a:cs typeface="Arial" panose="020B0604020202020204" pitchFamily="34" charset="0"/>
+              </a:rPr>
+              <a:t>ng cơ bản</a:t>
+            </a:r>
+            <a:r>
+              <a:rPr lang="vi-VN" altLang="en-US" sz="2400">
+                <a:latin typeface="Arial" panose="020B0604020202020204" pitchFamily="34" charset="0"/>
+                <a:cs typeface="Arial" panose="020B0604020202020204" pitchFamily="34" charset="0"/>
+              </a:rPr>
+              <a:t>. </a:t>
+            </a:r>
+            <a:r>
+              <a:rPr lang="en-US" altLang="en-US" sz="2400">
+                <a:latin typeface="Arial" panose="020B0604020202020204" pitchFamily="34" charset="0"/>
+                <a:cs typeface="Arial" panose="020B0604020202020204" pitchFamily="34" charset="0"/>
+              </a:rPr>
+              <a:t>Giao diện thân thiện, dễ sử dụng, </a:t>
+            </a:r>
+            <a:r>
+              <a:rPr lang="en-US" altLang="en-US" sz="2400">
+                <a:latin typeface="Arial" panose="020B0604020202020204" pitchFamily="34" charset="0"/>
+                <a:cs typeface="Arial" panose="020B0604020202020204" pitchFamily="34" charset="0"/>
+              </a:rPr>
+              <a:t>đ</a:t>
+            </a:r>
+            <a:r>
+              <a:rPr lang="en-US" altLang="en-US" sz="2400">
+                <a:latin typeface="Arial" panose="020B0604020202020204" pitchFamily="34" charset="0"/>
+                <a:cs typeface="Arial" panose="020B0604020202020204" pitchFamily="34" charset="0"/>
+              </a:rPr>
+              <a:t>ảm bảo t</a:t>
+            </a:r>
+            <a:r>
+              <a:rPr lang="en-US" altLang="en-US" sz="2400">
+                <a:latin typeface="Arial" panose="020B0604020202020204" pitchFamily="34" charset="0"/>
+                <a:cs typeface="Arial" panose="020B0604020202020204" pitchFamily="34" charset="0"/>
+              </a:rPr>
+              <a:t>ư</a:t>
+            </a:r>
+            <a:r>
+              <a:rPr lang="en-US" altLang="en-US" sz="2400">
+                <a:latin typeface="Arial" panose="020B0604020202020204" pitchFamily="34" charset="0"/>
+                <a:cs typeface="Arial" panose="020B0604020202020204" pitchFamily="34" charset="0"/>
+              </a:rPr>
+              <a:t>ơng thích trên nhiều thiết </a:t>
+            </a:r>
+            <a:r>
+              <a:rPr lang="vi-VN" altLang="en-US" sz="2400">
+                <a:latin typeface="Arial" panose="020B0604020202020204" pitchFamily="34" charset="0"/>
+                <a:cs typeface="Arial" panose="020B0604020202020204" pitchFamily="34" charset="0"/>
+              </a:rPr>
+              <a:t>bị</a:t>
+            </a:r>
+            <a:endParaRPr lang="vi-VN" altLang="en-US" sz="2400">
+              <a:latin typeface="Arial" panose="020B0604020202020204" pitchFamily="34" charset="0"/>
+              <a:cs typeface="Arial" panose="020B0604020202020204" pitchFamily="34" charset="0"/>
+            </a:endParaRPr>
+          </a:p>
+          <a:p>
+            <a:pPr algn="just">
+              <a:lnSpc>
+                <a:spcPct val="120000"/>
+              </a:lnSpc>
+            </a:pPr>
+            <a:r>
+              <a:rPr lang="en-US" altLang="en-US" sz="2400" b="1">
+                <a:latin typeface="Arial" panose="020B0604020202020204" pitchFamily="34" charset="0"/>
+                <a:cs typeface="Arial" panose="020B0604020202020204" pitchFamily="34" charset="0"/>
+              </a:rPr>
+              <a:t>Một số hạn chế</a:t>
+            </a:r>
+            <a:r>
+              <a:rPr lang="en-US" altLang="en-US" sz="2400">
+                <a:latin typeface="Arial" panose="020B0604020202020204" pitchFamily="34" charset="0"/>
+                <a:cs typeface="Arial" panose="020B0604020202020204" pitchFamily="34" charset="0"/>
+              </a:rPr>
+              <a:t>:</a:t>
+            </a:r>
+            <a:endParaRPr lang="en-US" altLang="en-US" sz="2400">
+              <a:latin typeface="Arial" panose="020B0604020202020204" pitchFamily="34" charset="0"/>
+              <a:cs typeface="Arial" panose="020B0604020202020204" pitchFamily="34" charset="0"/>
+            </a:endParaRPr>
+          </a:p>
+          <a:p>
+            <a:pPr algn="just">
+              <a:lnSpc>
+                <a:spcPct val="120000"/>
+              </a:lnSpc>
+            </a:pPr>
+            <a:r>
+              <a:rPr lang="en-US" altLang="en-US" sz="2400">
+                <a:latin typeface="Arial" panose="020B0604020202020204" pitchFamily="34" charset="0"/>
+                <a:cs typeface="Arial" panose="020B0604020202020204" pitchFamily="34" charset="0"/>
+              </a:rPr>
+              <a:t>Dữ liệu thử nghiệm chủ yếu </a:t>
+            </a:r>
+            <a:r>
+              <a:rPr lang="en-US" altLang="en-US" sz="2400">
+                <a:latin typeface="Arial" panose="020B0604020202020204" pitchFamily="34" charset="0"/>
+                <a:cs typeface="Arial" panose="020B0604020202020204" pitchFamily="34" charset="0"/>
+              </a:rPr>
+              <a:t>đư</a:t>
+            </a:r>
+            <a:r>
+              <a:rPr lang="en-US" altLang="en-US" sz="2400">
+                <a:latin typeface="Arial" panose="020B0604020202020204" pitchFamily="34" charset="0"/>
+                <a:cs typeface="Arial" panose="020B0604020202020204" pitchFamily="34" charset="0"/>
+              </a:rPr>
+              <a:t>ợc thu thập từ Internet nên thông tin có thể bị sai lệch. Hệ thống hiện tại mới dừng lại ở mức quản l</a:t>
+            </a:r>
+            <a:r>
+              <a:rPr lang="en-US" altLang="en-US" sz="2400">
+                <a:latin typeface="Arial" panose="020B0604020202020204" pitchFamily="34" charset="0"/>
+                <a:cs typeface="Arial" panose="020B0604020202020204" pitchFamily="34" charset="0"/>
+              </a:rPr>
+              <a:t>ý</a:t>
+            </a:r>
+            <a:r>
+              <a:rPr lang="en-US" altLang="en-US" sz="2400">
+                <a:latin typeface="Arial" panose="020B0604020202020204" pitchFamily="34" charset="0"/>
+                <a:cs typeface="Arial" panose="020B0604020202020204" pitchFamily="34" charset="0"/>
+              </a:rPr>
+              <a:t> sản phẩm với quy mô nhỏ, ch</a:t>
+            </a:r>
+            <a:r>
+              <a:rPr lang="en-US" altLang="en-US" sz="2400">
+                <a:latin typeface="Arial" panose="020B0604020202020204" pitchFamily="34" charset="0"/>
+                <a:cs typeface="Arial" panose="020B0604020202020204" pitchFamily="34" charset="0"/>
+              </a:rPr>
+              <a:t>ư</a:t>
+            </a:r>
+            <a:r>
+              <a:rPr lang="en-US" altLang="en-US" sz="2400">
+                <a:latin typeface="Arial" panose="020B0604020202020204" pitchFamily="34" charset="0"/>
+                <a:cs typeface="Arial" panose="020B0604020202020204" pitchFamily="34" charset="0"/>
+              </a:rPr>
+              <a:t>a tích hợp các tính n</a:t>
+            </a:r>
+            <a:r>
+              <a:rPr lang="en-US" altLang="en-US" sz="2400">
+                <a:latin typeface="Arial" panose="020B0604020202020204" pitchFamily="34" charset="0"/>
+                <a:cs typeface="Arial" panose="020B0604020202020204" pitchFamily="34" charset="0"/>
+              </a:rPr>
+              <a:t>ă</a:t>
+            </a:r>
+            <a:r>
+              <a:rPr lang="en-US" altLang="en-US" sz="2400">
+                <a:latin typeface="Arial" panose="020B0604020202020204" pitchFamily="34" charset="0"/>
+                <a:cs typeface="Arial" panose="020B0604020202020204" pitchFamily="34" charset="0"/>
+              </a:rPr>
+              <a:t>ng t</a:t>
+            </a:r>
+            <a:r>
+              <a:rPr lang="en-US" altLang="en-US" sz="2400">
+                <a:latin typeface="Arial" panose="020B0604020202020204" pitchFamily="34" charset="0"/>
+                <a:cs typeface="Arial" panose="020B0604020202020204" pitchFamily="34" charset="0"/>
+              </a:rPr>
+              <a:t>ư</a:t>
+            </a:r>
+            <a:r>
+              <a:rPr lang="en-US" altLang="en-US" sz="2400">
+                <a:latin typeface="Arial" panose="020B0604020202020204" pitchFamily="34" charset="0"/>
+                <a:cs typeface="Arial" panose="020B0604020202020204" pitchFamily="34" charset="0"/>
+              </a:rPr>
+              <a:t>ơng tác nâng cao nh</a:t>
+            </a:r>
+            <a:r>
+              <a:rPr lang="en-US" altLang="en-US" sz="2400">
+                <a:latin typeface="Arial" panose="020B0604020202020204" pitchFamily="34" charset="0"/>
+                <a:cs typeface="Arial" panose="020B0604020202020204" pitchFamily="34" charset="0"/>
+              </a:rPr>
+              <a:t>ư</a:t>
+            </a:r>
+            <a:r>
+              <a:rPr lang="en-US" altLang="en-US" sz="2400">
+                <a:latin typeface="Arial" panose="020B0604020202020204" pitchFamily="34" charset="0"/>
+                <a:cs typeface="Arial" panose="020B0604020202020204" pitchFamily="34" charset="0"/>
+              </a:rPr>
+              <a:t> thanh toán trực tuyến, </a:t>
+            </a:r>
+            <a:r>
+              <a:rPr lang="en-US" altLang="en-US" sz="2400">
+                <a:latin typeface="Arial" panose="020B0604020202020204" pitchFamily="34" charset="0"/>
+                <a:cs typeface="Arial" panose="020B0604020202020204" pitchFamily="34" charset="0"/>
+              </a:rPr>
+              <a:t>đ</a:t>
+            </a:r>
+            <a:r>
+              <a:rPr lang="en-US" altLang="en-US" sz="2400">
+                <a:latin typeface="Arial" panose="020B0604020202020204" pitchFamily="34" charset="0"/>
+                <a:cs typeface="Arial" panose="020B0604020202020204" pitchFamily="34" charset="0"/>
+              </a:rPr>
+              <a:t>ánh giá từ ng</a:t>
+            </a:r>
+            <a:r>
+              <a:rPr lang="en-US" altLang="en-US" sz="2400">
+                <a:latin typeface="Arial" panose="020B0604020202020204" pitchFamily="34" charset="0"/>
+                <a:cs typeface="Arial" panose="020B0604020202020204" pitchFamily="34" charset="0"/>
+              </a:rPr>
+              <a:t>ư</a:t>
+            </a:r>
+            <a:r>
+              <a:rPr lang="en-US" altLang="en-US" sz="2400">
+                <a:latin typeface="Arial" panose="020B0604020202020204" pitchFamily="34" charset="0"/>
+                <a:cs typeface="Arial" panose="020B0604020202020204" pitchFamily="34" charset="0"/>
+              </a:rPr>
+              <a:t>ời dùng.</a:t>
+            </a:r>
+            <a:endParaRPr lang="en-US" altLang="en-US" sz="2400">
+              <a:latin typeface="Arial" panose="020B0604020202020204" pitchFamily="34" charset="0"/>
+              <a:cs typeface="Arial" panose="020B0604020202020204" pitchFamily="34" charset="0"/>
+            </a:endParaRPr>
+          </a:p>
+          <a:p>
+            <a:pPr algn="just">
+              <a:lnSpc>
+                <a:spcPct val="120000"/>
+              </a:lnSpc>
+            </a:pPr>
+            <a:endParaRPr lang="en-US" altLang="en-US" sz="2400">
+              <a:latin typeface="Arial" panose="020B0604020202020204" pitchFamily="34" charset="0"/>
+              <a:cs typeface="Arial" panose="020B0604020202020204" pitchFamily="34" charset="0"/>
+            </a:endParaRPr>
+          </a:p>
+        </p:txBody>
+      </p:sp>
     </p:spTree>
   </p:cSld>
   <p:clrMapOvr>
@@ -9101,7 +9455,7 @@
                 <a:cs typeface="Arial" panose="020B0604020202020204" pitchFamily="34" charset="0"/>
                 <a:sym typeface="+mn-lt"/>
               </a:rPr>
-              <a:t>Kết </a:t>
+              <a:t>Hướng phát </a:t>
             </a:r>
             <a:r>
               <a:rPr lang="vi-VN" altLang="en-US" sz="2400" b="1" dirty="0">
@@ -9110,7 +9464,7 @@
                 <a:cs typeface="Arial" panose="020B0604020202020204" pitchFamily="34" charset="0"/>
                 <a:sym typeface="+mn-lt"/>
               </a:rPr>
-              <a:t>luận</a:t>
+              <a:t>triển</a:t>
             </a:r>
             <a:endParaRPr lang="vi-VN" altLang="en-US" sz="2400" b="1" dirty="0">
               <a:latin typeface="Arial" panose="020B0604020202020204" pitchFamily="34" charset="0"/>
@@ -9129,8 +9483,8 @@
         </p:nvSpPr>
         <p:spPr>
           <a:xfrm>
-            <a:off x="1233170" y="2226310"/>
-            <a:ext cx="9609455" cy="4078605"/>
+            <a:off x="1233170" y="2342515"/>
+            <a:ext cx="9609455" cy="3636010"/>
           </a:xfrm>
           <a:prstGeom prst="rect">
             <a:avLst/>
@@ -9152,21 +9506,21 @@
                 <a:latin typeface="Arial" panose="020B0604020202020204" pitchFamily="34" charset="0"/>
                 <a:cs typeface="Arial" panose="020B0604020202020204" pitchFamily="34" charset="0"/>
               </a:rPr>
-              <a:t>Hoàn thiện yêu cầu </a:t>
+              <a:t>Nâng cao tính n</a:t>
             </a:r>
             <a:r>
               <a:rPr lang="en-US" altLang="en-US" sz="2400" b="1">
                 <a:latin typeface="Arial" panose="020B0604020202020204" pitchFamily="34" charset="0"/>
                 <a:cs typeface="Arial" panose="020B0604020202020204" pitchFamily="34" charset="0"/>
               </a:rPr>
-              <a:t>đ</a:t>
+              <a:t>ă</a:t>
             </a:r>
             <a:r>
               <a:rPr lang="en-US" altLang="en-US" sz="2400" b="1">
                 <a:latin typeface="Arial" panose="020B0604020202020204" pitchFamily="34" charset="0"/>
                 <a:cs typeface="Arial" panose="020B0604020202020204" pitchFamily="34" charset="0"/>
               </a:rPr>
-              <a:t>ề ra</a:t>
+              <a:t>ng</a:t>
             </a:r>
             <a:r>
               <a:rPr lang="en-US" altLang="en-US" sz="2400">
@@ -9191,114 +9545,79 @@
                 <a:latin typeface="Arial" panose="020B0604020202020204" pitchFamily="34" charset="0"/>
                 <a:cs typeface="Arial" panose="020B0604020202020204" pitchFamily="34" charset="0"/>
               </a:rPr>
-              <a:t>Website </a:t>
+              <a:t>Bổ sung thêm các chức n</a:t>
             </a:r>
             <a:r>
               <a:rPr lang="en-US" altLang="en-US" sz="2400">
                 <a:latin typeface="Arial" panose="020B0604020202020204" pitchFamily="34" charset="0"/>
                 <a:cs typeface="Arial" panose="020B0604020202020204" pitchFamily="34" charset="0"/>
               </a:rPr>
-              <a:t>đ</a:t>
+              <a:t>ă</a:t>
             </a:r>
             <a:r>
               <a:rPr lang="en-US" altLang="en-US" sz="2400">
                 <a:latin typeface="Arial" panose="020B0604020202020204" pitchFamily="34" charset="0"/>
                 <a:cs typeface="Arial" panose="020B0604020202020204" pitchFamily="34" charset="0"/>
               </a:rPr>
-              <a:t>ã </a:t>
+              <a:t>ng nâng cao nh</a:t>
             </a:r>
             <a:r>
               <a:rPr lang="en-US" altLang="en-US" sz="2400">
                 <a:latin typeface="Arial" panose="020B0604020202020204" pitchFamily="34" charset="0"/>
                 <a:cs typeface="Arial" panose="020B0604020202020204" pitchFamily="34" charset="0"/>
               </a:rPr>
-              <a:t>đ</a:t>
+              <a:t>ư</a:t>
             </a:r>
             <a:r>
               <a:rPr lang="en-US" altLang="en-US" sz="2400">
                 <a:latin typeface="Arial" panose="020B0604020202020204" pitchFamily="34" charset="0"/>
                 <a:cs typeface="Arial" panose="020B0604020202020204" pitchFamily="34" charset="0"/>
               </a:rPr>
-              <a:t>áp ứng </a:t>
+              <a:t> chatbot hỗ trợ t</a:t>
             </a:r>
             <a:r>
               <a:rPr lang="en-US" altLang="en-US" sz="2400">
                 <a:latin typeface="Arial" panose="020B0604020202020204" pitchFamily="34" charset="0"/>
                 <a:cs typeface="Arial" panose="020B0604020202020204" pitchFamily="34" charset="0"/>
               </a:rPr>
-              <a:t>đư</a:t>
+              <a:t>ư</a:t>
             </a:r>
             <a:r>
               <a:rPr lang="en-US" altLang="en-US" sz="2400">
                 <a:latin typeface="Arial" panose="020B0604020202020204" pitchFamily="34" charset="0"/>
                 <a:cs typeface="Arial" panose="020B0604020202020204" pitchFamily="34" charset="0"/>
               </a:rPr>
-              <a:t>ợc các yêu cầu về chức n</a:t>
+              <a:t> vấn cho khách hàng</a:t>
+            </a:r>
+            <a:r>
+              <a:rPr lang="vi-VN" altLang="en-US" sz="2400">
+                <a:latin typeface="Arial" panose="020B0604020202020204" pitchFamily="34" charset="0"/>
+                <a:cs typeface="Arial" panose="020B0604020202020204" pitchFamily="34" charset="0"/>
+              </a:rPr>
+              <a:t>. </a:t>
             </a:r>
             <a:r>
               <a:rPr lang="en-US" altLang="en-US" sz="2400">
                 <a:latin typeface="Arial" panose="020B0604020202020204" pitchFamily="34" charset="0"/>
                 <a:cs typeface="Arial" panose="020B0604020202020204" pitchFamily="34" charset="0"/>
               </a:rPr>
-              <a:t>ă</a:t>
+              <a:t>Xây dựng hệ thống gợi </a:t>
             </a:r>
             <a:r>
               <a:rPr lang="en-US" altLang="en-US" sz="2400">
                 <a:latin typeface="Arial" panose="020B0604020202020204" pitchFamily="34" charset="0"/>
                 <a:cs typeface="Arial" panose="020B0604020202020204" pitchFamily="34" charset="0"/>
               </a:rPr>
-              <a:t>ng cơ bản</a:t>
-            </a:r>
-            <a:r>
-              <a:rPr lang="vi-VN" altLang="en-US" sz="2400">
-                <a:latin typeface="Arial" panose="020B0604020202020204" pitchFamily="34" charset="0"/>
-                <a:cs typeface="Arial" panose="020B0604020202020204" pitchFamily="34" charset="0"/>
-              </a:rPr>
-              <a:t>. </a:t>
+              <a:t>ý</a:t>
             </a:r>
             <a:r>
               <a:rPr lang="en-US" altLang="en-US" sz="2400">
                 <a:latin typeface="Arial" panose="020B0604020202020204" pitchFamily="34" charset="0"/>
                 <a:cs typeface="Arial" panose="020B0604020202020204" pitchFamily="34" charset="0"/>
               </a:rPr>
-              <a:t>Giao diện thân thiện, dễ sử dụng, </a:t>
-            </a:r>
-            <a:r>
-              <a:rPr lang="en-US" altLang="en-US" sz="2400">
-                <a:latin typeface="Arial" panose="020B0604020202020204" pitchFamily="34" charset="0"/>
-                <a:cs typeface="Arial" panose="020B0604020202020204" pitchFamily="34" charset="0"/>
-              </a:rPr>
-              <a:t>đ</a:t>
-            </a:r>
-            <a:r>
-              <a:rPr lang="en-US" altLang="en-US" sz="2400">
-                <a:latin typeface="Arial" panose="020B0604020202020204" pitchFamily="34" charset="0"/>
-                <a:cs typeface="Arial" panose="020B0604020202020204" pitchFamily="34" charset="0"/>
-              </a:rPr>
-              <a:t>ảm bảo t</a:t>
-            </a:r>
-            <a:r>
-              <a:rPr lang="en-US" altLang="en-US" sz="2400">
-                <a:latin typeface="Arial" panose="020B0604020202020204" pitchFamily="34" charset="0"/>
-                <a:cs typeface="Arial" panose="020B0604020202020204" pitchFamily="34" charset="0"/>
-              </a:rPr>
-              <a:t>ư</a:t>
-            </a:r>
-            <a:r>
-              <a:rPr lang="en-US" altLang="en-US" sz="2400">
-                <a:latin typeface="Arial" panose="020B0604020202020204" pitchFamily="34" charset="0"/>
-                <a:cs typeface="Arial" panose="020B0604020202020204" pitchFamily="34" charset="0"/>
-              </a:rPr>
-              <a:t>ơng thích trên nhiều thiết </a:t>
-            </a:r>
-            <a:r>
-              <a:rPr lang="vi-VN" altLang="en-US" sz="2400">
-                <a:latin typeface="Arial" panose="020B0604020202020204" pitchFamily="34" charset="0"/>
-                <a:cs typeface="Arial" panose="020B0604020202020204" pitchFamily="34" charset="0"/>
-              </a:rPr>
-              <a:t>bị</a:t>
-            </a:r>
-            <a:endParaRPr lang="vi-VN" altLang="en-US" sz="2400">
+              <a:t> sản phẩm dựa trên lịch sử tìm kiếm của khách hàng</a:t>
+            </a:r>
+            <a:endParaRPr lang="en-US" altLang="en-US" sz="2400">
               <a:latin typeface="Arial" panose="020B0604020202020204" pitchFamily="34" charset="0"/>
               <a:cs typeface="Arial" panose="020B0604020202020204" pitchFamily="34" charset="0"/>
             </a:endParaRPr>
@@ -9314,7 +9633,35 @@
                 <a:latin typeface="Arial" panose="020B0604020202020204" pitchFamily="34" charset="0"/>
                 <a:cs typeface="Arial" panose="020B0604020202020204" pitchFamily="34" charset="0"/>
               </a:rPr>
-              <a:t>Một số hạn chế</a:t>
+              <a:t>T</a:t>
+            </a:r>
+            <a:r>
+              <a:rPr lang="en-US" altLang="en-US" sz="2400" b="1">
+                <a:latin typeface="Arial" panose="020B0604020202020204" pitchFamily="34" charset="0"/>
+                <a:cs typeface="Arial" panose="020B0604020202020204" pitchFamily="34" charset="0"/>
+              </a:rPr>
+              <a:t>ă</a:t>
+            </a:r>
+            <a:r>
+              <a:rPr lang="en-US" altLang="en-US" sz="2400" b="1">
+                <a:latin typeface="Arial" panose="020B0604020202020204" pitchFamily="34" charset="0"/>
+                <a:cs typeface="Arial" panose="020B0604020202020204" pitchFamily="34" charset="0"/>
+              </a:rPr>
+              <a:t>ng c</a:t>
+            </a:r>
+            <a:r>
+              <a:rPr lang="en-US" altLang="en-US" sz="2400" b="1">
+                <a:latin typeface="Arial" panose="020B0604020202020204" pitchFamily="34" charset="0"/>
+                <a:cs typeface="Arial" panose="020B0604020202020204" pitchFamily="34" charset="0"/>
+              </a:rPr>
+              <a:t>ư</a:t>
+            </a:r>
+            <a:r>
+              <a:rPr lang="en-US" altLang="en-US" sz="2400" b="1">
+                <a:latin typeface="Arial" panose="020B0604020202020204" pitchFamily="34" charset="0"/>
+                <a:cs typeface="Arial" panose="020B0604020202020204" pitchFamily="34" charset="0"/>
+              </a:rPr>
+              <a:t>ờng bảo mật</a:t>
             </a:r>
             <a:r>
               <a:rPr lang="en-US" altLang="en-US" sz="2400">
@@ -9339,119 +9686,7 @@
                 <a:latin typeface="Arial" panose="020B0604020202020204" pitchFamily="34" charset="0"/>
                 <a:cs typeface="Arial" panose="020B0604020202020204" pitchFamily="34" charset="0"/>
               </a:rPr>
-              <a:t>Dữ liệu thử nghiệm chủ yếu </a:t>
-            </a:r>
-            <a:r>
-              <a:rPr lang="en-US" altLang="en-US" sz="2400">
-                <a:latin typeface="Arial" panose="020B0604020202020204" pitchFamily="34" charset="0"/>
-                <a:cs typeface="Arial" panose="020B0604020202020204" pitchFamily="34" charset="0"/>
-              </a:rPr>
-              <a:t>đư</a:t>
-            </a:r>
-            <a:r>
-              <a:rPr lang="en-US" altLang="en-US" sz="2400">
-                <a:latin typeface="Arial" panose="020B0604020202020204" pitchFamily="34" charset="0"/>
-                <a:cs typeface="Arial" panose="020B0604020202020204" pitchFamily="34" charset="0"/>
-              </a:rPr>
-              <a:t>ợc thu thập từ Internet nên thông tin có thể bị sai lệch. Hệ thống hiện tại mới dừng lại ở mức quản l</a:t>
-            </a:r>
-            <a:r>
-              <a:rPr lang="en-US" altLang="en-US" sz="2400">
-                <a:latin typeface="Arial" panose="020B0604020202020204" pitchFamily="34" charset="0"/>
-                <a:cs typeface="Arial" panose="020B0604020202020204" pitchFamily="34" charset="0"/>
-              </a:rPr>
-              <a:t>ý</a:t>
-            </a:r>
-            <a:r>
-              <a:rPr lang="en-US" altLang="en-US" sz="2400">
-                <a:latin typeface="Arial" panose="020B0604020202020204" pitchFamily="34" charset="0"/>
-                <a:cs typeface="Arial" panose="020B0604020202020204" pitchFamily="34" charset="0"/>
-              </a:rPr>
-              <a:t> sản phẩm với quy mô nhỏ, ch</a:t>
-            </a:r>
-            <a:r>
-              <a:rPr lang="en-US" altLang="en-US" sz="2400">
-                <a:latin typeface="Arial" panose="020B0604020202020204" pitchFamily="34" charset="0"/>
-                <a:cs typeface="Arial" panose="020B0604020202020204" pitchFamily="34" charset="0"/>
-              </a:rPr>
-              <a:t>ư</a:t>
-            </a:r>
-            <a:r>
-              <a:rPr lang="en-US" altLang="en-US" sz="2400">
-                <a:latin typeface="Arial" panose="020B0604020202020204" pitchFamily="34" charset="0"/>
-                <a:cs typeface="Arial" panose="020B0604020202020204" pitchFamily="34" charset="0"/>
-              </a:rPr>
-              <a:t>a tích hợp các tính n</a:t>
-            </a:r>
-            <a:r>
-              <a:rPr lang="en-US" altLang="en-US" sz="2400">
-                <a:latin typeface="Arial" panose="020B0604020202020204" pitchFamily="34" charset="0"/>
-                <a:cs typeface="Arial" panose="020B0604020202020204" pitchFamily="34" charset="0"/>
-              </a:rPr>
-              <a:t>ă</a:t>
-            </a:r>
-            <a:r>
-              <a:rPr lang="en-US" altLang="en-US" sz="2400">
-                <a:latin typeface="Arial" panose="020B0604020202020204" pitchFamily="34" charset="0"/>
-                <a:cs typeface="Arial" panose="020B0604020202020204" pitchFamily="34" charset="0"/>
-              </a:rPr>
-              <a:t>ng t</a:t>
-            </a:r>
-            <a:r>
-              <a:rPr lang="en-US" altLang="en-US" sz="2400">
-                <a:latin typeface="Arial" panose="020B0604020202020204" pitchFamily="34" charset="0"/>
-                <a:cs typeface="Arial" panose="020B0604020202020204" pitchFamily="34" charset="0"/>
-              </a:rPr>
-              <a:t>ư</a:t>
-            </a:r>
-            <a:r>
-              <a:rPr lang="en-US" altLang="en-US" sz="2400">
-                <a:latin typeface="Arial" panose="020B0604020202020204" pitchFamily="34" charset="0"/>
-                <a:cs typeface="Arial" panose="020B0604020202020204" pitchFamily="34" charset="0"/>
-              </a:rPr>
-              <a:t>ơng tác nâng cao nh</a:t>
-            </a:r>
-            <a:r>
-              <a:rPr lang="en-US" altLang="en-US" sz="2400">
-                <a:latin typeface="Arial" panose="020B0604020202020204" pitchFamily="34" charset="0"/>
-                <a:cs typeface="Arial" panose="020B0604020202020204" pitchFamily="34" charset="0"/>
-              </a:rPr>
-              <a:t>ư</a:t>
-            </a:r>
-            <a:r>
-              <a:rPr lang="en-US" altLang="en-US" sz="2400">
-                <a:latin typeface="Arial" panose="020B0604020202020204" pitchFamily="34" charset="0"/>
-                <a:cs typeface="Arial" panose="020B0604020202020204" pitchFamily="34" charset="0"/>
-              </a:rPr>
-              <a:t> thanh toán trực tuyến, </a:t>
-            </a:r>
-            <a:r>
-              <a:rPr lang="en-US" altLang="en-US" sz="2400">
-                <a:latin typeface="Arial" panose="020B0604020202020204" pitchFamily="34" charset="0"/>
-                <a:cs typeface="Arial" panose="020B0604020202020204" pitchFamily="34" charset="0"/>
-              </a:rPr>
-              <a:t>đ</a:t>
-            </a:r>
-            <a:r>
-              <a:rPr lang="en-US" altLang="en-US" sz="2400">
-                <a:latin typeface="Arial" panose="020B0604020202020204" pitchFamily="34" charset="0"/>
-                <a:cs typeface="Arial" panose="020B0604020202020204" pitchFamily="34" charset="0"/>
-              </a:rPr>
-              <a:t>ánh giá từ ng</a:t>
-            </a:r>
-            <a:r>
-              <a:rPr lang="en-US" altLang="en-US" sz="2400">
-                <a:latin typeface="Arial" panose="020B0604020202020204" pitchFamily="34" charset="0"/>
-                <a:cs typeface="Arial" panose="020B0604020202020204" pitchFamily="34" charset="0"/>
-              </a:rPr>
-              <a:t>ư</a:t>
-            </a:r>
-            <a:r>
-              <a:rPr lang="en-US" altLang="en-US" sz="2400">
-                <a:latin typeface="Arial" panose="020B0604020202020204" pitchFamily="34" charset="0"/>
-                <a:cs typeface="Arial" panose="020B0604020202020204" pitchFamily="34" charset="0"/>
-              </a:rPr>
-              <a:t>ời dùng.</a:t>
+              <a:t> Triển khai các biện pháp bảo mật cao hơn, bao gồm mã hóa dữ liệu</a:t>
             </a:r>
             <a:endParaRPr lang="en-US" altLang="en-US" sz="2400">
               <a:latin typeface="Arial" panose="020B0604020202020204" pitchFamily="34" charset="0"/>
@@ -9464,6 +9699,59 @@
                 <a:spcPct val="120000"/>
               </a:lnSpc>
             </a:pPr>
+            <a:r>
+              <a:rPr lang="en-US" altLang="en-US" sz="2400">
+                <a:latin typeface="Arial" panose="020B0604020202020204" pitchFamily="34" charset="0"/>
+                <a:cs typeface="Arial" panose="020B0604020202020204" pitchFamily="34" charset="0"/>
+              </a:rPr>
+              <a:t>Cải thiện hiệu xuất:</a:t>
+            </a:r>
+            <a:endParaRPr lang="en-US" altLang="en-US" sz="2400">
+              <a:latin typeface="Arial" panose="020B0604020202020204" pitchFamily="34" charset="0"/>
+              <a:cs typeface="Arial" panose="020B0604020202020204" pitchFamily="34" charset="0"/>
+            </a:endParaRPr>
+          </a:p>
+          <a:p>
+            <a:pPr algn="just">
+              <a:lnSpc>
+                <a:spcPct val="120000"/>
+              </a:lnSpc>
+            </a:pPr>
+            <a:r>
+              <a:rPr lang="en-US" altLang="en-US" sz="2400">
+                <a:latin typeface="Arial" panose="020B0604020202020204" pitchFamily="34" charset="0"/>
+                <a:cs typeface="Arial" panose="020B0604020202020204" pitchFamily="34" charset="0"/>
+              </a:rPr>
+              <a:t>Tối </a:t>
+            </a:r>
+            <a:r>
+              <a:rPr lang="en-US" altLang="en-US" sz="2400">
+                <a:latin typeface="Arial" panose="020B0604020202020204" pitchFamily="34" charset="0"/>
+                <a:cs typeface="Arial" panose="020B0604020202020204" pitchFamily="34" charset="0"/>
+              </a:rPr>
+              <a:t>ư</a:t>
+            </a:r>
+            <a:r>
+              <a:rPr lang="en-US" altLang="en-US" sz="2400">
+                <a:latin typeface="Arial" panose="020B0604020202020204" pitchFamily="34" charset="0"/>
+                <a:cs typeface="Arial" panose="020B0604020202020204" pitchFamily="34" charset="0"/>
+              </a:rPr>
+              <a:t>u hóa tốc </a:t>
+            </a:r>
+            <a:r>
+              <a:rPr lang="en-US" altLang="en-US" sz="2400">
+                <a:latin typeface="Arial" panose="020B0604020202020204" pitchFamily="34" charset="0"/>
+                <a:cs typeface="Arial" panose="020B0604020202020204" pitchFamily="34" charset="0"/>
+              </a:rPr>
+              <a:t>đ</a:t>
+            </a:r>
+            <a:r>
+              <a:rPr lang="en-US" altLang="en-US" sz="2400">
+                <a:latin typeface="Arial" panose="020B0604020202020204" pitchFamily="34" charset="0"/>
+                <a:cs typeface="Arial" panose="020B0604020202020204" pitchFamily="34" charset="0"/>
+              </a:rPr>
+              <a:t>ộ tải trang và truy vấn cơ sở dữ liệu </a:t>
+            </a:r>
             <a:endParaRPr lang="en-US" altLang="en-US" sz="2400">
               <a:latin typeface="Arial" panose="020B0604020202020204" pitchFamily="34" charset="0"/>
               <a:cs typeface="Arial" panose="020B0604020202020204" pitchFamily="34" charset="0"/>
@@ -9492,591 +9780,6 @@
 </file>
 
 <file path=ppt/slides/slide22.xml><?xml version="1.0" encoding="utf-8"?>
-<p:sld xmlns:a="http://schemas.openxmlformats.org/drawingml/2006/main" xmlns:r="http://schemas.openxmlformats.org/officeDocument/2006/relationships" xmlns:p="http://schemas.openxmlformats.org/presentationml/2006/main">
-  <p:cSld>
-    <p:spTree>
-      <p:nvGrpSpPr>
-        <p:cNvPr id="1" name=""/>
-        <p:cNvGrpSpPr/>
-        <p:nvPr/>
-      </p:nvGrpSpPr>
-      <p:grpSpPr>
-        <a:xfrm>
-          <a:off x="0" y="0"/>
-          <a:ext cx="0" cy="0"/>
-          <a:chOff x="0" y="0"/>
-          <a:chExt cx="0" cy="0"/>
-        </a:xfrm>
-      </p:grpSpPr>
-      <p:sp>
-        <p:nvSpPr>
-          <p:cNvPr id="34" name="Flying impression design ——飞印象设计是一家专业的广告设计制作工作室，专注于平面、OFFICE、摄影等业务，工作室成立于2016年，拥有高水平的设计团队，已经立足于市场，今后将输出更多精致作品。"/>
-          <p:cNvSpPr/>
-          <p:nvPr/>
-        </p:nvSpPr>
-        <p:spPr>
-          <a:xfrm>
-            <a:off x="0" y="356235"/>
-            <a:ext cx="7210425" cy="791845"/>
-          </a:xfrm>
-          <a:custGeom>
-            <a:avLst/>
-            <a:gdLst>
-              <a:gd name="connsiteX0" fmla="*/ 3825076 w 4547934"/>
-              <a:gd name="connsiteY0" fmla="*/ 0 h 792109"/>
-              <a:gd name="connsiteX1" fmla="*/ 4252413 w 4547934"/>
-              <a:gd name="connsiteY1" fmla="*/ 0 h 792109"/>
-              <a:gd name="connsiteX2" fmla="*/ 4547934 w 4547934"/>
-              <a:gd name="connsiteY2" fmla="*/ 295521 h 792109"/>
-              <a:gd name="connsiteX3" fmla="*/ 4051347 w 4547934"/>
-              <a:gd name="connsiteY3" fmla="*/ 792108 h 792109"/>
-              <a:gd name="connsiteX4" fmla="*/ 3938334 w 4547934"/>
-              <a:gd name="connsiteY4" fmla="*/ 792108 h 792109"/>
-              <a:gd name="connsiteX5" fmla="*/ 3938334 w 4547934"/>
-              <a:gd name="connsiteY5" fmla="*/ 792109 h 792109"/>
-              <a:gd name="connsiteX6" fmla="*/ 0 w 4547934"/>
-              <a:gd name="connsiteY6" fmla="*/ 792109 h 792109"/>
-              <a:gd name="connsiteX7" fmla="*/ 0 w 4547934"/>
-              <a:gd name="connsiteY7" fmla="*/ 1 h 792109"/>
-              <a:gd name="connsiteX8" fmla="*/ 3825077 w 4547934"/>
-              <a:gd name="connsiteY8" fmla="*/ 1 h 792109"/>
-              <a:gd name="connsiteX9" fmla="*/ 3825076 w 4547934"/>
-              <a:gd name="connsiteY9" fmla="*/ 0 h 792109"/>
-            </a:gdLst>
-            <a:ahLst/>
-            <a:cxnLst>
-              <a:cxn ang="0">
-                <a:pos x="connsiteX0" y="connsiteY0"/>
-              </a:cxn>
-              <a:cxn ang="0">
-                <a:pos x="connsiteX1" y="connsiteY1"/>
-              </a:cxn>
-              <a:cxn ang="0">
-                <a:pos x="connsiteX2" y="connsiteY2"/>
-              </a:cxn>
-              <a:cxn ang="0">
-                <a:pos x="connsiteX3" y="connsiteY3"/>
-              </a:cxn>
-              <a:cxn ang="0">
-                <a:pos x="connsiteX4" y="connsiteY4"/>
-              </a:cxn>
-              <a:cxn ang="0">
-                <a:pos x="connsiteX5" y="connsiteY5"/>
-              </a:cxn>
-              <a:cxn ang="0">
-                <a:pos x="connsiteX6" y="connsiteY6"/>
-              </a:cxn>
-              <a:cxn ang="0">
-                <a:pos x="connsiteX7" y="connsiteY7"/>
-              </a:cxn>
-              <a:cxn ang="0">
-                <a:pos x="connsiteX8" y="connsiteY8"/>
-              </a:cxn>
-              <a:cxn ang="0">
-                <a:pos x="connsiteX9" y="connsiteY9"/>
-              </a:cxn>
-            </a:cxnLst>
-            <a:rect l="l" t="t" r="r" b="b"/>
-            <a:pathLst>
-              <a:path w="4547934" h="792109">
-                <a:moveTo>
-                  <a:pt x="3825076" y="0"/>
-                </a:moveTo>
-                <a:lnTo>
-                  <a:pt x="4252413" y="0"/>
-                </a:lnTo>
-                <a:lnTo>
-                  <a:pt x="4547934" y="295521"/>
-                </a:lnTo>
-                <a:lnTo>
-                  <a:pt x="4051347" y="792108"/>
-                </a:lnTo>
-                <a:lnTo>
-                  <a:pt x="3938334" y="792108"/>
-                </a:lnTo>
-                <a:lnTo>
-                  <a:pt x="3938334" y="792109"/>
-                </a:lnTo>
-                <a:lnTo>
-                  <a:pt x="0" y="792109"/>
-                </a:lnTo>
-                <a:lnTo>
-                  <a:pt x="0" y="1"/>
-                </a:lnTo>
-                <a:lnTo>
-                  <a:pt x="3825077" y="1"/>
-                </a:lnTo>
-                <a:lnTo>
-                  <a:pt x="3825076" y="0"/>
-                </a:lnTo>
-                <a:close/>
-              </a:path>
-            </a:pathLst>
-          </a:custGeom>
-          <a:gradFill>
-            <a:gsLst>
-              <a:gs pos="0">
-                <a:srgbClr val="8C1302"/>
-              </a:gs>
-              <a:gs pos="100000">
-                <a:srgbClr val="DE2511"/>
-              </a:gs>
-            </a:gsLst>
-            <a:lin ang="0" scaled="0"/>
-          </a:gradFill>
-          <a:ln>
-            <a:noFill/>
-          </a:ln>
-        </p:spPr>
-        <p:style>
-          <a:lnRef idx="2">
-            <a:schemeClr val="accent1">
-              <a:shade val="50000"/>
-            </a:schemeClr>
-          </a:lnRef>
-          <a:fillRef idx="1">
-            <a:schemeClr val="accent1"/>
-          </a:fillRef>
-          <a:effectRef idx="0">
-            <a:schemeClr val="accent1"/>
-          </a:effectRef>
-          <a:fontRef idx="minor">
-            <a:schemeClr val="lt1"/>
-          </a:fontRef>
-        </p:style>
-        <p:txBody>
-          <a:bodyPr rtlCol="0" anchor="ctr"/>
-          <a:lstStyle/>
-          <a:p>
-            <a:pPr algn="ctr"/>
-            <a:endParaRPr lang="zh-CN" altLang="en-US">
-              <a:latin typeface="Arial" panose="020B0604020202020204" pitchFamily="34" charset="0"/>
-              <a:cs typeface="Arial" panose="020B0604020202020204" pitchFamily="34" charset="0"/>
-            </a:endParaRPr>
-          </a:p>
-        </p:txBody>
-      </p:sp>
-      <p:sp>
-        <p:nvSpPr>
-          <p:cNvPr id="21" name="Flying impression design ——飞印象设计是一家专业的广告设计制作工作室，专注于平面、OFFICE、摄影等业务，工作室成立于2016年，拥有高水平的设计团队，已经立足于市场，今后将输出更多精致作品。"/>
-          <p:cNvSpPr txBox="1"/>
-          <p:nvPr/>
-        </p:nvSpPr>
-        <p:spPr>
-          <a:xfrm>
-            <a:off x="452755" y="466725"/>
-            <a:ext cx="6268720" cy="570865"/>
-          </a:xfrm>
-          <a:prstGeom prst="rect">
-            <a:avLst/>
-          </a:prstGeom>
-          <a:noFill/>
-          <a:ln>
-            <a:noFill/>
-          </a:ln>
-        </p:spPr>
-        <p:txBody>
-          <a:bodyPr wrap="square" rtlCol="0">
-            <a:spAutoFit/>
-          </a:bodyPr>
-          <a:lstStyle/>
-          <a:p>
-            <a:pPr>
-              <a:lnSpc>
-                <a:spcPct val="130000"/>
-              </a:lnSpc>
-            </a:pPr>
-            <a:r>
-              <a:rPr lang="vi-VN" altLang="en-US" sz="2400" b="1" dirty="0">
-                <a:solidFill>
-                  <a:schemeClr val="bg1"/>
-                </a:solidFill>
-                <a:latin typeface="Arial" panose="020B0604020202020204" pitchFamily="34" charset="0"/>
-                <a:ea typeface="Microsoft YaHei" panose="020B0503020204020204" pitchFamily="34" charset="-122"/>
-                <a:cs typeface="Arial" panose="020B0604020202020204" pitchFamily="34" charset="0"/>
-              </a:rPr>
-              <a:t>Chương 5. Kết luận và hướng phát </a:t>
-            </a:r>
-            <a:r>
-              <a:rPr lang="vi-VN" altLang="en-US" sz="2400" b="1" dirty="0">
-                <a:solidFill>
-                  <a:schemeClr val="bg1"/>
-                </a:solidFill>
-                <a:latin typeface="Arial" panose="020B0604020202020204" pitchFamily="34" charset="0"/>
-                <a:ea typeface="Microsoft YaHei" panose="020B0503020204020204" pitchFamily="34" charset="-122"/>
-                <a:cs typeface="Arial" panose="020B0604020202020204" pitchFamily="34" charset="0"/>
-              </a:rPr>
-              <a:t>triển</a:t>
-            </a:r>
-            <a:endParaRPr lang="vi-VN" altLang="en-US" sz="2400" b="1" dirty="0">
-              <a:solidFill>
-                <a:schemeClr val="bg1"/>
-              </a:solidFill>
-              <a:latin typeface="Arial" panose="020B0604020202020204" pitchFamily="34" charset="0"/>
-              <a:ea typeface="Microsoft YaHei" panose="020B0503020204020204" pitchFamily="34" charset="-122"/>
-              <a:cs typeface="Arial" panose="020B0604020202020204" pitchFamily="34" charset="0"/>
-            </a:endParaRPr>
-          </a:p>
-        </p:txBody>
-      </p:sp>
-      <p:sp>
-        <p:nvSpPr>
-          <p:cNvPr id="41" name="Flying impression design ——飞印象设计是一家专业的广告设计制作工作室，专注于平面、OFFICE、摄影等业务，工作室成立于2016年，拥有高水平的设计团队，已经立足于市场，今后将输出更多精致作品。"/>
-          <p:cNvSpPr txBox="1"/>
-          <p:nvPr>
-            <p:custDataLst>
-              <p:tags r:id="rId1"/>
-            </p:custDataLst>
-          </p:nvPr>
-        </p:nvSpPr>
-        <p:spPr>
-          <a:xfrm>
-            <a:off x="927100" y="1534160"/>
-            <a:ext cx="6383655" cy="460375"/>
-          </a:xfrm>
-          <a:prstGeom prst="rect">
-            <a:avLst/>
-          </a:prstGeom>
-          <a:noFill/>
-        </p:spPr>
-        <p:txBody>
-          <a:bodyPr wrap="square" rtlCol="0">
-            <a:spAutoFit/>
-          </a:bodyPr>
-          <a:lstStyle/>
-          <a:p>
-            <a:r>
-              <a:rPr lang="vi-VN" altLang="en-US" sz="2400" b="1" dirty="0">
-                <a:latin typeface="Arial" panose="020B0604020202020204" pitchFamily="34" charset="0"/>
-                <a:ea typeface="Microsoft YaHei" panose="020B0503020204020204" pitchFamily="34" charset="-122"/>
-                <a:cs typeface="Arial" panose="020B0604020202020204" pitchFamily="34" charset="0"/>
-                <a:sym typeface="+mn-lt"/>
-              </a:rPr>
-              <a:t>Hướng phát </a:t>
-            </a:r>
-            <a:r>
-              <a:rPr lang="vi-VN" altLang="en-US" sz="2400" b="1" dirty="0">
-                <a:latin typeface="Arial" panose="020B0604020202020204" pitchFamily="34" charset="0"/>
-                <a:ea typeface="Microsoft YaHei" panose="020B0503020204020204" pitchFamily="34" charset="-122"/>
-                <a:cs typeface="Arial" panose="020B0604020202020204" pitchFamily="34" charset="0"/>
-                <a:sym typeface="+mn-lt"/>
-              </a:rPr>
-              <a:t>triển</a:t>
-            </a:r>
-            <a:endParaRPr lang="vi-VN" altLang="en-US" sz="2400" b="1" dirty="0">
-              <a:latin typeface="Arial" panose="020B0604020202020204" pitchFamily="34" charset="0"/>
-              <a:ea typeface="Microsoft YaHei" panose="020B0503020204020204" pitchFamily="34" charset="-122"/>
-              <a:cs typeface="Arial" panose="020B0604020202020204" pitchFamily="34" charset="0"/>
-              <a:sym typeface="+mn-lt"/>
-            </a:endParaRPr>
-          </a:p>
-        </p:txBody>
-      </p:sp>
-      <p:sp>
-        <p:nvSpPr>
-          <p:cNvPr id="2" name="Text Box 1"/>
-          <p:cNvSpPr txBox="1"/>
-          <p:nvPr/>
-        </p:nvSpPr>
-        <p:spPr>
-          <a:xfrm>
-            <a:off x="1233170" y="2342515"/>
-            <a:ext cx="9609455" cy="3636010"/>
-          </a:xfrm>
-          <a:prstGeom prst="rect">
-            <a:avLst/>
-          </a:prstGeom>
-          <a:noFill/>
-        </p:spPr>
-        <p:txBody>
-          <a:bodyPr wrap="square" rtlCol="0">
-            <a:spAutoFit/>
-          </a:bodyPr>
-          <a:p>
-            <a:pPr algn="just">
-              <a:lnSpc>
-                <a:spcPct val="120000"/>
-              </a:lnSpc>
-            </a:pPr>
-            <a:r>
-              <a:rPr lang="en-US" altLang="en-US" sz="2400" b="1">
-                <a:latin typeface="Arial" panose="020B0604020202020204" pitchFamily="34" charset="0"/>
-                <a:cs typeface="Arial" panose="020B0604020202020204" pitchFamily="34" charset="0"/>
-              </a:rPr>
-              <a:t>Nâng cao tính n</a:t>
-            </a:r>
-            <a:r>
-              <a:rPr lang="en-US" altLang="en-US" sz="2400" b="1">
-                <a:latin typeface="Arial" panose="020B0604020202020204" pitchFamily="34" charset="0"/>
-                <a:cs typeface="Arial" panose="020B0604020202020204" pitchFamily="34" charset="0"/>
-              </a:rPr>
-              <a:t>ă</a:t>
-            </a:r>
-            <a:r>
-              <a:rPr lang="en-US" altLang="en-US" sz="2400" b="1">
-                <a:latin typeface="Arial" panose="020B0604020202020204" pitchFamily="34" charset="0"/>
-                <a:cs typeface="Arial" panose="020B0604020202020204" pitchFamily="34" charset="0"/>
-              </a:rPr>
-              <a:t>ng</a:t>
-            </a:r>
-            <a:r>
-              <a:rPr lang="en-US" altLang="en-US" sz="2400">
-                <a:latin typeface="Arial" panose="020B0604020202020204" pitchFamily="34" charset="0"/>
-                <a:cs typeface="Arial" panose="020B0604020202020204" pitchFamily="34" charset="0"/>
-              </a:rPr>
-              <a:t>:</a:t>
-            </a:r>
-            <a:endParaRPr lang="en-US" altLang="en-US" sz="2400">
-              <a:latin typeface="Arial" panose="020B0604020202020204" pitchFamily="34" charset="0"/>
-              <a:cs typeface="Arial" panose="020B0604020202020204" pitchFamily="34" charset="0"/>
-            </a:endParaRPr>
-          </a:p>
-          <a:p>
-            <a:pPr algn="just">
-              <a:lnSpc>
-                <a:spcPct val="120000"/>
-              </a:lnSpc>
-            </a:pPr>
-            <a:r>
-              <a:rPr lang="en-US" altLang="en-US" sz="2400">
-                <a:latin typeface="Arial" panose="020B0604020202020204" pitchFamily="34" charset="0"/>
-                <a:cs typeface="Arial" panose="020B0604020202020204" pitchFamily="34" charset="0"/>
-              </a:rPr>
-              <a:t>Bổ sung thêm các chức n</a:t>
-            </a:r>
-            <a:r>
-              <a:rPr lang="en-US" altLang="en-US" sz="2400">
-                <a:latin typeface="Arial" panose="020B0604020202020204" pitchFamily="34" charset="0"/>
-                <a:cs typeface="Arial" panose="020B0604020202020204" pitchFamily="34" charset="0"/>
-              </a:rPr>
-              <a:t>ă</a:t>
-            </a:r>
-            <a:r>
-              <a:rPr lang="en-US" altLang="en-US" sz="2400">
-                <a:latin typeface="Arial" panose="020B0604020202020204" pitchFamily="34" charset="0"/>
-                <a:cs typeface="Arial" panose="020B0604020202020204" pitchFamily="34" charset="0"/>
-              </a:rPr>
-              <a:t>ng nâng cao nh</a:t>
-            </a:r>
-            <a:r>
-              <a:rPr lang="en-US" altLang="en-US" sz="2400">
-                <a:latin typeface="Arial" panose="020B0604020202020204" pitchFamily="34" charset="0"/>
-                <a:cs typeface="Arial" panose="020B0604020202020204" pitchFamily="34" charset="0"/>
-              </a:rPr>
-              <a:t>ư</a:t>
-            </a:r>
-            <a:r>
-              <a:rPr lang="en-US" altLang="en-US" sz="2400">
-                <a:latin typeface="Arial" panose="020B0604020202020204" pitchFamily="34" charset="0"/>
-                <a:cs typeface="Arial" panose="020B0604020202020204" pitchFamily="34" charset="0"/>
-              </a:rPr>
-              <a:t> chatbot hỗ trợ t</a:t>
-            </a:r>
-            <a:r>
-              <a:rPr lang="en-US" altLang="en-US" sz="2400">
-                <a:latin typeface="Arial" panose="020B0604020202020204" pitchFamily="34" charset="0"/>
-                <a:cs typeface="Arial" panose="020B0604020202020204" pitchFamily="34" charset="0"/>
-              </a:rPr>
-              <a:t>ư</a:t>
-            </a:r>
-            <a:r>
-              <a:rPr lang="en-US" altLang="en-US" sz="2400">
-                <a:latin typeface="Arial" panose="020B0604020202020204" pitchFamily="34" charset="0"/>
-                <a:cs typeface="Arial" panose="020B0604020202020204" pitchFamily="34" charset="0"/>
-              </a:rPr>
-              <a:t> vấn cho khách hàng</a:t>
-            </a:r>
-            <a:r>
-              <a:rPr lang="vi-VN" altLang="en-US" sz="2400">
-                <a:latin typeface="Arial" panose="020B0604020202020204" pitchFamily="34" charset="0"/>
-                <a:cs typeface="Arial" panose="020B0604020202020204" pitchFamily="34" charset="0"/>
-              </a:rPr>
-              <a:t>. </a:t>
-            </a:r>
-            <a:r>
-              <a:rPr lang="en-US" altLang="en-US" sz="2400">
-                <a:latin typeface="Arial" panose="020B0604020202020204" pitchFamily="34" charset="0"/>
-                <a:cs typeface="Arial" panose="020B0604020202020204" pitchFamily="34" charset="0"/>
-              </a:rPr>
-              <a:t>Xây dựng hệ thống gợi </a:t>
-            </a:r>
-            <a:r>
-              <a:rPr lang="en-US" altLang="en-US" sz="2400">
-                <a:latin typeface="Arial" panose="020B0604020202020204" pitchFamily="34" charset="0"/>
-                <a:cs typeface="Arial" panose="020B0604020202020204" pitchFamily="34" charset="0"/>
-              </a:rPr>
-              <a:t>ý</a:t>
-            </a:r>
-            <a:r>
-              <a:rPr lang="en-US" altLang="en-US" sz="2400">
-                <a:latin typeface="Arial" panose="020B0604020202020204" pitchFamily="34" charset="0"/>
-                <a:cs typeface="Arial" panose="020B0604020202020204" pitchFamily="34" charset="0"/>
-              </a:rPr>
-              <a:t> sản phẩm dựa trên lịch sử tìm kiếm của khách hàng</a:t>
-            </a:r>
-            <a:endParaRPr lang="en-US" altLang="en-US" sz="2400">
-              <a:latin typeface="Arial" panose="020B0604020202020204" pitchFamily="34" charset="0"/>
-              <a:cs typeface="Arial" panose="020B0604020202020204" pitchFamily="34" charset="0"/>
-            </a:endParaRPr>
-          </a:p>
-          <a:p>
-            <a:pPr algn="just">
-              <a:lnSpc>
-                <a:spcPct val="120000"/>
-              </a:lnSpc>
-            </a:pPr>
-            <a:r>
-              <a:rPr lang="en-US" altLang="en-US" sz="2400" b="1">
-                <a:latin typeface="Arial" panose="020B0604020202020204" pitchFamily="34" charset="0"/>
-                <a:cs typeface="Arial" panose="020B0604020202020204" pitchFamily="34" charset="0"/>
-              </a:rPr>
-              <a:t>T</a:t>
-            </a:r>
-            <a:r>
-              <a:rPr lang="en-US" altLang="en-US" sz="2400" b="1">
-                <a:latin typeface="Arial" panose="020B0604020202020204" pitchFamily="34" charset="0"/>
-                <a:cs typeface="Arial" panose="020B0604020202020204" pitchFamily="34" charset="0"/>
-              </a:rPr>
-              <a:t>ă</a:t>
-            </a:r>
-            <a:r>
-              <a:rPr lang="en-US" altLang="en-US" sz="2400" b="1">
-                <a:latin typeface="Arial" panose="020B0604020202020204" pitchFamily="34" charset="0"/>
-                <a:cs typeface="Arial" panose="020B0604020202020204" pitchFamily="34" charset="0"/>
-              </a:rPr>
-              <a:t>ng c</a:t>
-            </a:r>
-            <a:r>
-              <a:rPr lang="en-US" altLang="en-US" sz="2400" b="1">
-                <a:latin typeface="Arial" panose="020B0604020202020204" pitchFamily="34" charset="0"/>
-                <a:cs typeface="Arial" panose="020B0604020202020204" pitchFamily="34" charset="0"/>
-              </a:rPr>
-              <a:t>ư</a:t>
-            </a:r>
-            <a:r>
-              <a:rPr lang="en-US" altLang="en-US" sz="2400" b="1">
-                <a:latin typeface="Arial" panose="020B0604020202020204" pitchFamily="34" charset="0"/>
-                <a:cs typeface="Arial" panose="020B0604020202020204" pitchFamily="34" charset="0"/>
-              </a:rPr>
-              <a:t>ờng bảo mật</a:t>
-            </a:r>
-            <a:r>
-              <a:rPr lang="en-US" altLang="en-US" sz="2400">
-                <a:latin typeface="Arial" panose="020B0604020202020204" pitchFamily="34" charset="0"/>
-                <a:cs typeface="Arial" panose="020B0604020202020204" pitchFamily="34" charset="0"/>
-              </a:rPr>
-              <a:t>:</a:t>
-            </a:r>
-            <a:endParaRPr lang="en-US" altLang="en-US" sz="2400">
-              <a:latin typeface="Arial" panose="020B0604020202020204" pitchFamily="34" charset="0"/>
-              <a:cs typeface="Arial" panose="020B0604020202020204" pitchFamily="34" charset="0"/>
-            </a:endParaRPr>
-          </a:p>
-          <a:p>
-            <a:pPr algn="just">
-              <a:lnSpc>
-                <a:spcPct val="120000"/>
-              </a:lnSpc>
-            </a:pPr>
-            <a:r>
-              <a:rPr lang="en-US" altLang="en-US" sz="2400">
-                <a:latin typeface="Arial" panose="020B0604020202020204" pitchFamily="34" charset="0"/>
-                <a:cs typeface="Arial" panose="020B0604020202020204" pitchFamily="34" charset="0"/>
-              </a:rPr>
-              <a:t> Triển khai các biện pháp bảo mật cao hơn, bao gồm mã hóa dữ liệu</a:t>
-            </a:r>
-            <a:endParaRPr lang="en-US" altLang="en-US" sz="2400">
-              <a:latin typeface="Arial" panose="020B0604020202020204" pitchFamily="34" charset="0"/>
-              <a:cs typeface="Arial" panose="020B0604020202020204" pitchFamily="34" charset="0"/>
-            </a:endParaRPr>
-          </a:p>
-          <a:p>
-            <a:pPr algn="just">
-              <a:lnSpc>
-                <a:spcPct val="120000"/>
-              </a:lnSpc>
-            </a:pPr>
-            <a:r>
-              <a:rPr lang="en-US" altLang="en-US" sz="2400">
-                <a:latin typeface="Arial" panose="020B0604020202020204" pitchFamily="34" charset="0"/>
-                <a:cs typeface="Arial" panose="020B0604020202020204" pitchFamily="34" charset="0"/>
-              </a:rPr>
-              <a:t>Cải thiện hiệu xuất:</a:t>
-            </a:r>
-            <a:endParaRPr lang="en-US" altLang="en-US" sz="2400">
-              <a:latin typeface="Arial" panose="020B0604020202020204" pitchFamily="34" charset="0"/>
-              <a:cs typeface="Arial" panose="020B0604020202020204" pitchFamily="34" charset="0"/>
-            </a:endParaRPr>
-          </a:p>
-          <a:p>
-            <a:pPr algn="just">
-              <a:lnSpc>
-                <a:spcPct val="120000"/>
-              </a:lnSpc>
-            </a:pPr>
-            <a:r>
-              <a:rPr lang="en-US" altLang="en-US" sz="2400">
-                <a:latin typeface="Arial" panose="020B0604020202020204" pitchFamily="34" charset="0"/>
-                <a:cs typeface="Arial" panose="020B0604020202020204" pitchFamily="34" charset="0"/>
-              </a:rPr>
-              <a:t>Tối </a:t>
-            </a:r>
-            <a:r>
-              <a:rPr lang="en-US" altLang="en-US" sz="2400">
-                <a:latin typeface="Arial" panose="020B0604020202020204" pitchFamily="34" charset="0"/>
-                <a:cs typeface="Arial" panose="020B0604020202020204" pitchFamily="34" charset="0"/>
-              </a:rPr>
-              <a:t>ư</a:t>
-            </a:r>
-            <a:r>
-              <a:rPr lang="en-US" altLang="en-US" sz="2400">
-                <a:latin typeface="Arial" panose="020B0604020202020204" pitchFamily="34" charset="0"/>
-                <a:cs typeface="Arial" panose="020B0604020202020204" pitchFamily="34" charset="0"/>
-              </a:rPr>
-              <a:t>u hóa tốc </a:t>
-            </a:r>
-            <a:r>
-              <a:rPr lang="en-US" altLang="en-US" sz="2400">
-                <a:latin typeface="Arial" panose="020B0604020202020204" pitchFamily="34" charset="0"/>
-                <a:cs typeface="Arial" panose="020B0604020202020204" pitchFamily="34" charset="0"/>
-              </a:rPr>
-              <a:t>đ</a:t>
-            </a:r>
-            <a:r>
-              <a:rPr lang="en-US" altLang="en-US" sz="2400">
-                <a:latin typeface="Arial" panose="020B0604020202020204" pitchFamily="34" charset="0"/>
-                <a:cs typeface="Arial" panose="020B0604020202020204" pitchFamily="34" charset="0"/>
-              </a:rPr>
-              <a:t>ộ tải trang và truy vấn cơ sở dữ liệu </a:t>
-            </a:r>
-            <a:endParaRPr lang="en-US" altLang="en-US" sz="2400">
-              <a:latin typeface="Arial" panose="020B0604020202020204" pitchFamily="34" charset="0"/>
-              <a:cs typeface="Arial" panose="020B0604020202020204" pitchFamily="34" charset="0"/>
-            </a:endParaRPr>
-          </a:p>
-        </p:txBody>
-      </p:sp>
-    </p:spTree>
-  </p:cSld>
-  <p:clrMapOvr>
-    <a:masterClrMapping/>
-  </p:clrMapOvr>
-  <mc:AlternateContent xmlns:mc="http://schemas.openxmlformats.org/markup-compatibility/2006">
-    <mc:Choice xmlns:p14="http://schemas.microsoft.com/office/powerpoint/2010/main" Requires="p14">
-      <p:transition spd="med" p14:dur="699">
-        <p:fade/>
-      </p:transition>
-    </mc:Choice>
-    <mc:Fallback>
-      <p:transition spd="med">
-        <p:fade/>
-      </p:transition>
-    </mc:Fallback>
-  </mc:AlternateContent>
-</p:sld>
-</file>
-
-<file path=ppt/slides/slide23.xml><?xml version="1.0" encoding="utf-8"?>
 <p:sld xmlns:a="http://schemas.openxmlformats.org/drawingml/2006/main" xmlns:r="http://schemas.openxmlformats.org/officeDocument/2006/relationships" xmlns:p="http://schemas.openxmlformats.org/presentationml/2006/main">
   <p:cSld>
     <p:spTree>
@@ -11847,7 +11550,25 @@
                 <a:cs typeface="Arial" panose="020B0604020202020204" pitchFamily="34" charset="0"/>
                 <a:sym typeface="+mn-lt"/>
               </a:rPr>
-              <a:t>iao diện: HTML5, CSS3, Bootstrap</a:t>
+              <a:t>iao diện: HTML5, CSS3</a:t>
+            </a:r>
+            <a:r>
+              <a:rPr lang="vi-VN" altLang="en-US" sz="2200" dirty="0">
+                <a:latin typeface="Arial" panose="020B0604020202020204" pitchFamily="34" charset="0"/>
+                <a:ea typeface="Microsoft YaHei" panose="020B0503020204020204" pitchFamily="34" charset="-122"/>
+                <a:cs typeface="Arial" panose="020B0604020202020204" pitchFamily="34" charset="0"/>
+                <a:sym typeface="+mn-lt"/>
+              </a:rPr>
+              <a:t>, JavaScript</a:t>
+            </a:r>
+            <a:r>
+              <a:rPr lang="en-US" altLang="en-US" sz="2200" dirty="0">
+                <a:latin typeface="Arial" panose="020B0604020202020204" pitchFamily="34" charset="0"/>
+                <a:ea typeface="Microsoft YaHei" panose="020B0503020204020204" pitchFamily="34" charset="-122"/>
+                <a:cs typeface="Arial" panose="020B0604020202020204" pitchFamily="34" charset="0"/>
+                <a:sym typeface="+mn-lt"/>
+              </a:rPr>
+              <a:t>, Bootstrap</a:t>
             </a:r>
             <a:r>
               <a:rPr lang="vi-VN" altLang="en-US" sz="2200" dirty="0">
@@ -13814,7 +13535,7 @@
                 <a:cs typeface="Arial" panose="020B0604020202020204" pitchFamily="34" charset="0"/>
                 <a:sym typeface="+mn-lt"/>
               </a:rPr>
-              <a:t>Thiết kế giao diện người </a:t>
+              <a:t>Chức năng của hệ </a:t>
             </a:r>
             <a:r>
               <a:rPr lang="vi-VN" altLang="en-US" sz="2400" b="1" dirty="0">
@@ -13823,7 +13544,7 @@
                 <a:cs typeface="Arial" panose="020B0604020202020204" pitchFamily="34" charset="0"/>
                 <a:sym typeface="+mn-lt"/>
               </a:rPr>
-              <a:t>dùng</a:t>
+              <a:t>thống</a:t>
             </a:r>
             <a:endParaRPr lang="vi-VN" altLang="en-US" sz="2400" b="1" dirty="0">
               <a:latin typeface="Arial" panose="020B0604020202020204" pitchFamily="34" charset="0"/>
@@ -13847,7 +13568,7 @@
         <p:spPr>
           <a:xfrm>
             <a:off x="927100" y="2089785"/>
-            <a:ext cx="9989820" cy="2526665"/>
+            <a:ext cx="9989820" cy="2932430"/>
           </a:xfrm>
           <a:prstGeom prst="rect">
             <a:avLst/>
@@ -13860,95 +13581,64 @@
           </a:bodyPr>
           <a:lstStyle/>
           <a:p>
-            <a:pPr marL="0" indent="0" algn="just">
+            <a:pPr marL="342900" indent="-342900" algn="just">
               <a:lnSpc>
                 <a:spcPct val="120000"/>
               </a:lnSpc>
-              <a:buNone/>
+              <a:buFont typeface="Wingdings" panose="05000000000000000000" charset="0"/>
+              <a:buChar char="Ø"/>
             </a:pPr>
-            <a:r>
-              <a:rPr lang="vi-VN" sz="2200" b="1" smtClean="0">
-                <a:latin typeface="Times New Roman" panose="02020603050405020304" charset="0"/>
-                <a:cs typeface="Times New Roman" panose="02020603050405020304" charset="0"/>
-                <a:sym typeface="+mn-ea"/>
-              </a:rPr>
-              <a:t>Giao diện</a:t>
-            </a:r>
-            <a:r>
-              <a:rPr lang="en-US" sz="2200" b="1" smtClean="0">
-                <a:latin typeface="Times New Roman" panose="02020603050405020304" charset="0"/>
-                <a:cs typeface="Times New Roman" panose="02020603050405020304" charset="0"/>
-                <a:sym typeface="+mn-ea"/>
-              </a:rPr>
-              <a:t>: </a:t>
-            </a:r>
             <a:r>
               <a:rPr lang="vi-VN" sz="2200" smtClean="0">
                 <a:latin typeface="Times New Roman" panose="02020603050405020304" charset="0"/>
                 <a:cs typeface="Times New Roman" panose="02020603050405020304" charset="0"/>
                 <a:sym typeface="+mn-ea"/>
               </a:rPr>
-              <a:t>Thiết </a:t>
-            </a:r>
-            <a:r>
-              <a:rPr lang="vi-VN" sz="2200">
-                <a:latin typeface="Times New Roman" panose="02020603050405020304" charset="0"/>
-                <a:cs typeface="Times New Roman" panose="02020603050405020304" charset="0"/>
-                <a:sym typeface="+mn-ea"/>
-              </a:rPr>
-              <a:t>kế giao diện website đẹp mắt, trực quan, thân thiện với người </a:t>
-            </a:r>
+              <a:t>Đăng nhập và đăng ký tài khoản người dùng</a:t>
+            </a:r>
+            <a:endParaRPr lang="vi-VN" sz="2200" smtClean="0">
+              <a:latin typeface="Times New Roman" panose="02020603050405020304" charset="0"/>
+              <a:cs typeface="Times New Roman" panose="02020603050405020304" charset="0"/>
+              <a:sym typeface="+mn-ea"/>
+            </a:endParaRPr>
+          </a:p>
+          <a:p>
+            <a:pPr marL="342900" indent="-342900" algn="just">
+              <a:lnSpc>
+                <a:spcPct val="120000"/>
+              </a:lnSpc>
+              <a:buFont typeface="Wingdings" panose="05000000000000000000" charset="0"/>
+              <a:buChar char="Ø"/>
+            </a:pPr>
             <a:r>
               <a:rPr lang="vi-VN" sz="2200" smtClean="0">
                 <a:latin typeface="Times New Roman" panose="02020603050405020304" charset="0"/>
                 <a:cs typeface="Times New Roman" panose="02020603050405020304" charset="0"/>
                 <a:sym typeface="+mn-ea"/>
               </a:rPr>
-              <a:t>dùng.</a:t>
-            </a:r>
-            <a:endParaRPr lang="en-US" sz="2200" smtClean="0">
+              <a:t>Tìm kiếm và lọc sản phẩm</a:t>
+            </a:r>
+            <a:endParaRPr lang="vi-VN" sz="2200" smtClean="0">
               <a:latin typeface="Times New Roman" panose="02020603050405020304" charset="0"/>
               <a:cs typeface="Times New Roman" panose="02020603050405020304" charset="0"/>
+              <a:sym typeface="+mn-ea"/>
             </a:endParaRPr>
           </a:p>
           <a:p>
-            <a:pPr marL="0" indent="0" algn="just">
+            <a:pPr marL="342900" indent="-342900" algn="just">
               <a:lnSpc>
                 <a:spcPct val="120000"/>
               </a:lnSpc>
-              <a:buNone/>
+              <a:buFont typeface="Wingdings" panose="05000000000000000000" charset="0"/>
+              <a:buChar char="Ø"/>
             </a:pPr>
             <a:r>
-              <a:rPr lang="en-US" sz="2200" b="1" smtClean="0">
+              <a:rPr lang="vi-VN" sz="2200" smtClean="0">
                 <a:latin typeface="Times New Roman" panose="02020603050405020304" charset="0"/>
                 <a:cs typeface="Times New Roman" panose="02020603050405020304" charset="0"/>
                 <a:sym typeface="+mn-ea"/>
               </a:rPr>
-              <a:t>Phát </a:t>
-            </a:r>
-            <a:r>
-              <a:rPr lang="en-US" sz="2200" b="1">
-                <a:latin typeface="Times New Roman" panose="02020603050405020304" charset="0"/>
-                <a:cs typeface="Times New Roman" panose="02020603050405020304" charset="0"/>
-                <a:sym typeface="+mn-ea"/>
-              </a:rPr>
-              <a:t>triển </a:t>
-            </a:r>
-            <a:r>
-              <a:rPr lang="en-US" sz="2200" b="1" smtClean="0">
-                <a:latin typeface="Times New Roman" panose="02020603050405020304" charset="0"/>
-                <a:cs typeface="Times New Roman" panose="02020603050405020304" charset="0"/>
-                <a:sym typeface="+mn-ea"/>
-              </a:rPr>
-              <a:t>front-end: </a:t>
-            </a:r>
-            <a:r>
-              <a:rPr lang="en-US" sz="2200" smtClean="0">
-                <a:latin typeface="Times New Roman" panose="02020603050405020304" charset="0"/>
-                <a:cs typeface="Times New Roman" panose="02020603050405020304" charset="0"/>
-                <a:sym typeface="+mn-ea"/>
-              </a:rPr>
-              <a:t>Sử </a:t>
+              <a:t>Cung </a:t>
             </a:r>
             <a:r>
               <a:rPr lang="en-US" sz="2200">
@@ -13956,106 +13646,143 @@
                 <a:cs typeface="Times New Roman" panose="02020603050405020304" charset="0"/>
                 <a:sym typeface="+mn-ea"/>
               </a:rPr>
-              <a:t>dụng các ngôn ngữ lập trình HTML, CSS, JavaScript để phát triển </a:t>
-            </a:r>
-            <a:r>
-              <a:rPr lang="en-US" sz="2200" smtClean="0">
+              <a:t>cấp thông tin chi tiết về các mẫu điện thoại vớ</a:t>
+            </a:r>
+            <a:r>
+              <a:rPr lang="vi-VN" altLang="en-US" sz="2200">
                 <a:latin typeface="Times New Roman" panose="02020603050405020304" charset="0"/>
                 <a:cs typeface="Times New Roman" panose="02020603050405020304" charset="0"/>
                 <a:sym typeface="+mn-ea"/>
               </a:rPr>
-              <a:t>front-end.</a:t>
-            </a:r>
-            <a:endParaRPr lang="en-US" sz="2200" smtClean="0">
+              <a:t>i thông tin cấu hình</a:t>
+            </a:r>
+            <a:r>
+              <a:rPr lang="en-US" sz="2200">
+                <a:latin typeface="Times New Roman" panose="02020603050405020304" charset="0"/>
+                <a:cs typeface="Times New Roman" panose="02020603050405020304" charset="0"/>
+                <a:sym typeface="+mn-ea"/>
+              </a:rPr>
+              <a:t>, giá, </a:t>
+            </a:r>
+            <a:r>
+              <a:rPr lang="vi-VN" altLang="en-US" sz="2200">
+                <a:latin typeface="Times New Roman" panose="02020603050405020304" charset="0"/>
+                <a:cs typeface="Times New Roman" panose="02020603050405020304" charset="0"/>
+                <a:sym typeface="+mn-ea"/>
+              </a:rPr>
+              <a:t>phiên bản màu sắc</a:t>
+            </a:r>
+            <a:endParaRPr lang="en-US" sz="2200">
               <a:latin typeface="Times New Roman" panose="02020603050405020304" charset="0"/>
               <a:cs typeface="Times New Roman" panose="02020603050405020304" charset="0"/>
               <a:sym typeface="+mn-ea"/>
             </a:endParaRPr>
           </a:p>
           <a:p>
-            <a:pPr marL="0" indent="0" algn="just">
+            <a:pPr marL="342900" indent="-342900" algn="just">
               <a:lnSpc>
                 <a:spcPct val="120000"/>
               </a:lnSpc>
-              <a:buNone/>
+              <a:buFont typeface="Wingdings" panose="05000000000000000000" charset="0"/>
+              <a:buChar char="Ø"/>
             </a:pPr>
             <a:r>
-              <a:rPr lang="vi-VN" altLang="en-US" sz="2200" b="1" smtClean="0">
+              <a:rPr lang="en-US" altLang="en-US" sz="2200" smtClean="0">
                 <a:latin typeface="Times New Roman" panose="02020603050405020304" charset="0"/>
                 <a:cs typeface="Times New Roman" panose="02020603050405020304" charset="0"/>
-              </a:rPr>
-              <a:t>Phát triển back-end:</a:t>
+                <a:sym typeface="+mn-ea"/>
+              </a:rPr>
+              <a:t>Quản l</a:t>
+            </a:r>
+            <a:r>
+              <a:rPr lang="en-US" altLang="en-US" sz="2200" smtClean="0">
+                <a:latin typeface="Times New Roman" panose="02020603050405020304" charset="0"/>
+                <a:cs typeface="Times New Roman" panose="02020603050405020304" charset="0"/>
+                <a:sym typeface="+mn-ea"/>
+              </a:rPr>
+              <a:t>ý</a:t>
+            </a:r>
+            <a:r>
+              <a:rPr lang="en-US" altLang="en-US" sz="2200" smtClean="0">
+                <a:latin typeface="Times New Roman" panose="02020603050405020304" charset="0"/>
+                <a:cs typeface="Times New Roman" panose="02020603050405020304" charset="0"/>
+                <a:sym typeface="+mn-ea"/>
+              </a:rPr>
+              <a:t> giỏ hàng: Ng</a:t>
+            </a:r>
+            <a:r>
+              <a:rPr lang="en-US" altLang="en-US" sz="2200" smtClean="0">
+                <a:latin typeface="Times New Roman" panose="02020603050405020304" charset="0"/>
+                <a:cs typeface="Times New Roman" panose="02020603050405020304" charset="0"/>
+                <a:sym typeface="+mn-ea"/>
+              </a:rPr>
+              <a:t>ư</a:t>
+            </a:r>
+            <a:r>
+              <a:rPr lang="en-US" altLang="en-US" sz="2200" smtClean="0">
+                <a:latin typeface="Times New Roman" panose="02020603050405020304" charset="0"/>
+                <a:cs typeface="Times New Roman" panose="02020603050405020304" charset="0"/>
+                <a:sym typeface="+mn-ea"/>
+              </a:rPr>
+              <a:t>ời dùng có thể thêm sản phẩm vào giỏ hàng, xóa sản phẩm, hoặc cập nhật số l</a:t>
+            </a:r>
+            <a:r>
+              <a:rPr lang="en-US" altLang="en-US" sz="2200" smtClean="0">
+                <a:latin typeface="Times New Roman" panose="02020603050405020304" charset="0"/>
+                <a:cs typeface="Times New Roman" panose="02020603050405020304" charset="0"/>
+                <a:sym typeface="+mn-ea"/>
+              </a:rPr>
+              <a:t>ư</a:t>
+            </a:r>
+            <a:r>
+              <a:rPr lang="en-US" altLang="en-US" sz="2200" smtClean="0">
+                <a:latin typeface="Times New Roman" panose="02020603050405020304" charset="0"/>
+                <a:cs typeface="Times New Roman" panose="02020603050405020304" charset="0"/>
+                <a:sym typeface="+mn-ea"/>
+              </a:rPr>
+              <a:t>ợng sản phẩm. </a:t>
+            </a:r>
+            <a:endParaRPr lang="en-US" altLang="en-US" sz="2200" smtClean="0">
+              <a:latin typeface="Times New Roman" panose="02020603050405020304" charset="0"/>
+              <a:cs typeface="Times New Roman" panose="02020603050405020304" charset="0"/>
+              <a:sym typeface="+mn-ea"/>
+            </a:endParaRPr>
+          </a:p>
+          <a:p>
+            <a:pPr marL="342900" indent="-342900" algn="just">
+              <a:lnSpc>
+                <a:spcPct val="120000"/>
+              </a:lnSpc>
+              <a:buFont typeface="Wingdings" panose="05000000000000000000" charset="0"/>
+              <a:buChar char="Ø"/>
+            </a:pPr>
+            <a:r>
+              <a:rPr lang="en-US" altLang="en-US" sz="2200" smtClean="0">
+                <a:latin typeface="Times New Roman" panose="02020603050405020304" charset="0"/>
+                <a:cs typeface="Times New Roman" panose="02020603050405020304" charset="0"/>
+                <a:sym typeface="+mn-ea"/>
+              </a:rPr>
+              <a:t>Đ</a:t>
+            </a:r>
+            <a:r>
+              <a:rPr lang="en-US" altLang="en-US" sz="2200" smtClean="0">
+                <a:latin typeface="Times New Roman" panose="02020603050405020304" charset="0"/>
+                <a:cs typeface="Times New Roman" panose="02020603050405020304" charset="0"/>
+                <a:sym typeface="+mn-ea"/>
+              </a:rPr>
+              <a:t>ặt hàng</a:t>
             </a:r>
             <a:r>
               <a:rPr lang="vi-VN" altLang="en-US" sz="2200" smtClean="0">
                 <a:latin typeface="Times New Roman" panose="02020603050405020304" charset="0"/>
                 <a:cs typeface="Times New Roman" panose="02020603050405020304" charset="0"/>
-              </a:rPr>
-              <a:t> Sử dụng các ngôn ngữ lập trình PHP và MYSQL để phát triển</a:t>
-            </a:r>
-            <a:endParaRPr lang="en-US" sz="2200" smtClean="0">
+                <a:sym typeface="+mn-ea"/>
+              </a:rPr>
+              <a:t> trực tuyến </a:t>
+            </a:r>
+            <a:endParaRPr lang="vi-VN" altLang="en-US" sz="2200" smtClean="0">
               <a:latin typeface="Times New Roman" panose="02020603050405020304" charset="0"/>
               <a:cs typeface="Times New Roman" panose="02020603050405020304" charset="0"/>
-            </a:endParaRPr>
-          </a:p>
-          <a:p>
-            <a:pPr marL="0" indent="0" algn="just">
-              <a:lnSpc>
-                <a:spcPct val="120000"/>
-              </a:lnSpc>
-              <a:buNone/>
-            </a:pPr>
-            <a:r>
-              <a:rPr lang="vi-VN" sz="2200" b="1" smtClean="0">
-                <a:latin typeface="Times New Roman" panose="02020603050405020304" charset="0"/>
-                <a:cs typeface="Times New Roman" panose="02020603050405020304" charset="0"/>
-                <a:sym typeface="+mn-ea"/>
-              </a:rPr>
-              <a:t>Kiểm </a:t>
-            </a:r>
-            <a:r>
-              <a:rPr lang="vi-VN" sz="2200" b="1">
-                <a:latin typeface="Times New Roman" panose="02020603050405020304" charset="0"/>
-                <a:cs typeface="Times New Roman" panose="02020603050405020304" charset="0"/>
-                <a:sym typeface="+mn-ea"/>
-              </a:rPr>
-              <a:t>thử </a:t>
-            </a:r>
-            <a:r>
-              <a:rPr lang="vi-VN" sz="2200" b="1" smtClean="0">
-                <a:latin typeface="Times New Roman" panose="02020603050405020304" charset="0"/>
-                <a:cs typeface="Times New Roman" panose="02020603050405020304" charset="0"/>
-                <a:sym typeface="+mn-ea"/>
-              </a:rPr>
-              <a:t>website</a:t>
-            </a:r>
-            <a:r>
-              <a:rPr lang="en-US" sz="2200" b="1" smtClean="0">
-                <a:latin typeface="Times New Roman" panose="02020603050405020304" charset="0"/>
-                <a:cs typeface="Times New Roman" panose="02020603050405020304" charset="0"/>
-                <a:sym typeface="+mn-ea"/>
-              </a:rPr>
-              <a:t>: </a:t>
-            </a:r>
-            <a:r>
-              <a:rPr lang="vi-VN" sz="2200" smtClean="0">
-                <a:latin typeface="Times New Roman" panose="02020603050405020304" charset="0"/>
-                <a:cs typeface="Times New Roman" panose="02020603050405020304" charset="0"/>
-                <a:sym typeface="+mn-ea"/>
-              </a:rPr>
-              <a:t>Kiểm </a:t>
-            </a:r>
-            <a:r>
-              <a:rPr lang="vi-VN" sz="2200">
-                <a:latin typeface="Times New Roman" panose="02020603050405020304" charset="0"/>
-                <a:cs typeface="Times New Roman" panose="02020603050405020304" charset="0"/>
-                <a:sym typeface="+mn-ea"/>
-              </a:rPr>
-              <a:t>tra tính năng, hiệu suất và khả năng tương thích của website trên các trình duyệt.</a:t>
-            </a:r>
-            <a:endParaRPr lang="en-US" altLang="en-US" sz="2200" smtClean="0">
-              <a:latin typeface="Arial" panose="020B0604020202020204" pitchFamily="34" charset="0"/>
-              <a:cs typeface="Arial" panose="020B0604020202020204" pitchFamily="34" charset="0"/>
               <a:sym typeface="+mn-ea"/>
             </a:endParaRPr>
           </a:p>
@@ -14342,7 +14069,7 @@
                 <a:cs typeface="Arial" panose="020B0604020202020204" pitchFamily="34" charset="0"/>
                 <a:sym typeface="+mn-lt"/>
               </a:rPr>
-              <a:t>Chức năng của hệ </a:t>
+              <a:t>Thiết kế xử </a:t>
             </a:r>
             <a:r>
               <a:rPr lang="vi-VN" altLang="en-US" sz="2400" b="1" dirty="0">
@@ -14351,7 +14078,7 @@
                 <a:cs typeface="Arial" panose="020B0604020202020204" pitchFamily="34" charset="0"/>
                 <a:sym typeface="+mn-lt"/>
               </a:rPr>
-              <a:t>thống</a:t>
+              <a:t>lý</a:t>
             </a:r>
             <a:endParaRPr lang="vi-VN" altLang="en-US" sz="2400" b="1" dirty="0">
               <a:latin typeface="Arial" panose="020B0604020202020204" pitchFamily="34" charset="0"/>
@@ -14362,20 +14089,41 @@
           </a:p>
         </p:txBody>
       </p:sp>
+      <p:pic>
+        <p:nvPicPr>
+          <p:cNvPr id="2" name="Picture 1"/>
+          <p:cNvPicPr>
+            <a:picLocks noChangeAspect="1"/>
+          </p:cNvPicPr>
+          <p:nvPr/>
+        </p:nvPicPr>
+        <p:blipFill>
+          <a:blip r:embed="rId2"/>
+          <a:srcRect l="2116" r="1172" b="833"/>
+          <a:stretch>
+            <a:fillRect/>
+          </a:stretch>
+        </p:blipFill>
+        <p:spPr>
+          <a:xfrm>
+            <a:off x="2941320" y="1994535"/>
+            <a:ext cx="6761480" cy="4004310"/>
+          </a:xfrm>
+          <a:prstGeom prst="rect">
+            <a:avLst/>
+          </a:prstGeom>
+        </p:spPr>
+      </p:pic>
       <p:sp>
         <p:nvSpPr>
-          <p:cNvPr id="42" name="Flying impression design ——飞印象设计是一家专业的广告设计制作工作室，专注于平面、OFFICE、摄影等业务，工作室成立于2016年，拥有高水平的设计团队，已经立足于市场，今后将输出更多精致作品。"/>
+          <p:cNvPr id="3" name="Text Box 2"/>
           <p:cNvSpPr txBox="1"/>
-          <p:nvPr>
-            <p:custDataLst>
-              <p:tags r:id="rId2"/>
-            </p:custDataLst>
-          </p:nvPr>
+          <p:nvPr/>
         </p:nvSpPr>
         <p:spPr>
           <a:xfrm>
-            <a:off x="927100" y="2089785"/>
-            <a:ext cx="9989820" cy="2932430"/>
+            <a:off x="4667885" y="6104890"/>
+            <a:ext cx="3453130" cy="368300"/>
           </a:xfrm>
           <a:prstGeom prst="rect">
             <a:avLst/>
@@ -14386,212 +14134,17 @@
           <a:bodyPr wrap="square" rtlCol="0">
             <a:spAutoFit/>
           </a:bodyPr>
-          <a:lstStyle/>
-          <a:p>
-            <a:pPr marL="342900" indent="-342900" algn="just">
-              <a:lnSpc>
-                <a:spcPct val="120000"/>
-              </a:lnSpc>
-              <a:buFont typeface="Wingdings" panose="05000000000000000000" charset="0"/>
-              <a:buChar char="Ø"/>
-            </a:pPr>
-            <a:r>
-              <a:rPr lang="vi-VN" sz="2200" smtClean="0">
-                <a:latin typeface="Times New Roman" panose="02020603050405020304" charset="0"/>
-                <a:cs typeface="Times New Roman" panose="02020603050405020304" charset="0"/>
-                <a:sym typeface="+mn-ea"/>
-              </a:rPr>
-              <a:t>Đăng nhập và đăng ký tài khoản người dùng</a:t>
-            </a:r>
-            <a:endParaRPr lang="vi-VN" sz="2200" smtClean="0">
-              <a:latin typeface="Times New Roman" panose="02020603050405020304" charset="0"/>
-              <a:cs typeface="Times New Roman" panose="02020603050405020304" charset="0"/>
-              <a:sym typeface="+mn-ea"/>
-            </a:endParaRPr>
-          </a:p>
-          <a:p>
-            <a:pPr marL="342900" indent="-342900" algn="just">
-              <a:lnSpc>
-                <a:spcPct val="120000"/>
-              </a:lnSpc>
-              <a:buFont typeface="Wingdings" panose="05000000000000000000" charset="0"/>
-              <a:buChar char="Ø"/>
-            </a:pPr>
-            <a:r>
-              <a:rPr lang="vi-VN" sz="2200" smtClean="0">
-                <a:latin typeface="Times New Roman" panose="02020603050405020304" charset="0"/>
-                <a:cs typeface="Times New Roman" panose="02020603050405020304" charset="0"/>
-                <a:sym typeface="+mn-ea"/>
-              </a:rPr>
-              <a:t>Tìm kiếm và lọc sản phẩm</a:t>
-            </a:r>
-            <a:endParaRPr lang="vi-VN" sz="2200" smtClean="0">
-              <a:latin typeface="Times New Roman" panose="02020603050405020304" charset="0"/>
-              <a:cs typeface="Times New Roman" panose="02020603050405020304" charset="0"/>
-              <a:sym typeface="+mn-ea"/>
-            </a:endParaRPr>
-          </a:p>
-          <a:p>
-            <a:pPr marL="342900" indent="-342900" algn="just">
-              <a:lnSpc>
-                <a:spcPct val="120000"/>
-              </a:lnSpc>
-              <a:buFont typeface="Wingdings" panose="05000000000000000000" charset="0"/>
-              <a:buChar char="Ø"/>
-            </a:pPr>
-            <a:r>
-              <a:rPr lang="vi-VN" sz="2200" smtClean="0">
-                <a:latin typeface="Times New Roman" panose="02020603050405020304" charset="0"/>
-                <a:cs typeface="Times New Roman" panose="02020603050405020304" charset="0"/>
-                <a:sym typeface="+mn-ea"/>
-              </a:rPr>
-              <a:t>Cung </a:t>
-            </a:r>
-            <a:r>
-              <a:rPr lang="en-US" sz="2200">
-                <a:latin typeface="Times New Roman" panose="02020603050405020304" charset="0"/>
-                <a:cs typeface="Times New Roman" panose="02020603050405020304" charset="0"/>
-                <a:sym typeface="+mn-ea"/>
-              </a:rPr>
-              <a:t>cấp thông tin chi tiết về các mẫu điện thoại vớ</a:t>
-            </a:r>
-            <a:r>
-              <a:rPr lang="vi-VN" altLang="en-US" sz="2200">
-                <a:latin typeface="Times New Roman" panose="02020603050405020304" charset="0"/>
-                <a:cs typeface="Times New Roman" panose="02020603050405020304" charset="0"/>
-                <a:sym typeface="+mn-ea"/>
-              </a:rPr>
-              <a:t>i thông tin cấu hình</a:t>
-            </a:r>
-            <a:r>
-              <a:rPr lang="en-US" sz="2200">
-                <a:latin typeface="Times New Roman" panose="02020603050405020304" charset="0"/>
-                <a:cs typeface="Times New Roman" panose="02020603050405020304" charset="0"/>
-                <a:sym typeface="+mn-ea"/>
-              </a:rPr>
-              <a:t>, giá, </a:t>
-            </a:r>
-            <a:r>
-              <a:rPr lang="vi-VN" altLang="en-US" sz="2200">
-                <a:latin typeface="Times New Roman" panose="02020603050405020304" charset="0"/>
-                <a:cs typeface="Times New Roman" panose="02020603050405020304" charset="0"/>
-                <a:sym typeface="+mn-ea"/>
-              </a:rPr>
-              <a:t>phiên bản màu sắc</a:t>
-            </a:r>
-            <a:endParaRPr lang="en-US" sz="2200">
-              <a:latin typeface="Times New Roman" panose="02020603050405020304" charset="0"/>
-              <a:cs typeface="Times New Roman" panose="02020603050405020304" charset="0"/>
-              <a:sym typeface="+mn-ea"/>
-            </a:endParaRPr>
-          </a:p>
-          <a:p>
-            <a:pPr marL="342900" indent="-342900" algn="just">
-              <a:lnSpc>
-                <a:spcPct val="120000"/>
-              </a:lnSpc>
-              <a:buFont typeface="Wingdings" panose="05000000000000000000" charset="0"/>
-              <a:buChar char="Ø"/>
-            </a:pPr>
-            <a:r>
-              <a:rPr lang="en-US" altLang="en-US" sz="2200" smtClean="0">
-                <a:latin typeface="Times New Roman" panose="02020603050405020304" charset="0"/>
-                <a:cs typeface="Times New Roman" panose="02020603050405020304" charset="0"/>
-                <a:sym typeface="+mn-ea"/>
-              </a:rPr>
-              <a:t>Quản l</a:t>
-            </a:r>
-            <a:r>
-              <a:rPr lang="en-US" altLang="en-US" sz="2200" smtClean="0">
-                <a:latin typeface="Times New Roman" panose="02020603050405020304" charset="0"/>
-                <a:cs typeface="Times New Roman" panose="02020603050405020304" charset="0"/>
-                <a:sym typeface="+mn-ea"/>
-              </a:rPr>
-              <a:t>ý</a:t>
-            </a:r>
-            <a:r>
-              <a:rPr lang="en-US" altLang="en-US" sz="2200" smtClean="0">
-                <a:latin typeface="Times New Roman" panose="02020603050405020304" charset="0"/>
-                <a:cs typeface="Times New Roman" panose="02020603050405020304" charset="0"/>
-                <a:sym typeface="+mn-ea"/>
-              </a:rPr>
-              <a:t> giỏ hàng: Ng</a:t>
-            </a:r>
-            <a:r>
-              <a:rPr lang="en-US" altLang="en-US" sz="2200" smtClean="0">
-                <a:latin typeface="Times New Roman" panose="02020603050405020304" charset="0"/>
-                <a:cs typeface="Times New Roman" panose="02020603050405020304" charset="0"/>
-                <a:sym typeface="+mn-ea"/>
-              </a:rPr>
-              <a:t>ư</a:t>
-            </a:r>
-            <a:r>
-              <a:rPr lang="en-US" altLang="en-US" sz="2200" smtClean="0">
-                <a:latin typeface="Times New Roman" panose="02020603050405020304" charset="0"/>
-                <a:cs typeface="Times New Roman" panose="02020603050405020304" charset="0"/>
-                <a:sym typeface="+mn-ea"/>
-              </a:rPr>
-              <a:t>ời dùng có thể thêm sản phẩm vào giỏ hàng, xóa sản phẩm, hoặc cập nhật số l</a:t>
-            </a:r>
-            <a:r>
-              <a:rPr lang="en-US" altLang="en-US" sz="2200" smtClean="0">
-                <a:latin typeface="Times New Roman" panose="02020603050405020304" charset="0"/>
-                <a:cs typeface="Times New Roman" panose="02020603050405020304" charset="0"/>
-                <a:sym typeface="+mn-ea"/>
-              </a:rPr>
-              <a:t>ư</a:t>
-            </a:r>
-            <a:r>
-              <a:rPr lang="en-US" altLang="en-US" sz="2200" smtClean="0">
-                <a:latin typeface="Times New Roman" panose="02020603050405020304" charset="0"/>
-                <a:cs typeface="Times New Roman" panose="02020603050405020304" charset="0"/>
-                <a:sym typeface="+mn-ea"/>
-              </a:rPr>
-              <a:t>ợng sản phẩm. </a:t>
-            </a:r>
-            <a:endParaRPr lang="en-US" altLang="en-US" sz="2200" smtClean="0">
-              <a:latin typeface="Times New Roman" panose="02020603050405020304" charset="0"/>
-              <a:cs typeface="Times New Roman" panose="02020603050405020304" charset="0"/>
-              <a:sym typeface="+mn-ea"/>
-            </a:endParaRPr>
-          </a:p>
-          <a:p>
-            <a:pPr marL="342900" indent="-342900" algn="just">
-              <a:lnSpc>
-                <a:spcPct val="120000"/>
-              </a:lnSpc>
-              <a:buFont typeface="Wingdings" panose="05000000000000000000" charset="0"/>
-              <a:buChar char="Ø"/>
-            </a:pPr>
-            <a:r>
-              <a:rPr lang="en-US" altLang="en-US" sz="2200" smtClean="0">
-                <a:latin typeface="Times New Roman" panose="02020603050405020304" charset="0"/>
-                <a:cs typeface="Times New Roman" panose="02020603050405020304" charset="0"/>
-                <a:sym typeface="+mn-ea"/>
-              </a:rPr>
-              <a:t>Đ</a:t>
-            </a:r>
-            <a:r>
-              <a:rPr lang="en-US" altLang="en-US" sz="2200" smtClean="0">
-                <a:latin typeface="Times New Roman" panose="02020603050405020304" charset="0"/>
-                <a:cs typeface="Times New Roman" panose="02020603050405020304" charset="0"/>
-                <a:sym typeface="+mn-ea"/>
-              </a:rPr>
-              <a:t>ặt hàng</a:t>
-            </a:r>
-            <a:r>
-              <a:rPr lang="vi-VN" altLang="en-US" sz="2200" smtClean="0">
-                <a:latin typeface="Times New Roman" panose="02020603050405020304" charset="0"/>
-                <a:cs typeface="Times New Roman" panose="02020603050405020304" charset="0"/>
-                <a:sym typeface="+mn-ea"/>
-              </a:rPr>
-              <a:t> trực tuyến </a:t>
-            </a:r>
-            <a:endParaRPr lang="vi-VN" altLang="en-US" sz="2200" smtClean="0">
-              <a:latin typeface="Times New Roman" panose="02020603050405020304" charset="0"/>
-              <a:cs typeface="Times New Roman" panose="02020603050405020304" charset="0"/>
-              <a:sym typeface="+mn-ea"/>
-            </a:endParaRPr>
+          <a:p>
+            <a:pPr algn="ctr"/>
+            <a:r>
+              <a:rPr lang="vi-VN" altLang="en-US"/>
+              <a:t>Sơ đồ use case tổng </a:t>
+            </a:r>
+            <a:r>
+              <a:rPr lang="vi-VN" altLang="en-US"/>
+              <a:t>quát</a:t>
+            </a:r>
+            <a:endParaRPr lang="vi-VN" altLang="en-US"/>
           </a:p>
         </p:txBody>
       </p:sp>
@@ -14882,18 +14435,6 @@
 <file path=ppt/tags/tag5.xml><?xml version="1.0" encoding="utf-8"?>
 <p:tagLst xmlns:p="http://schemas.openxmlformats.org/presentationml/2006/main">
   <p:tag name="KSO_WM_DIAGRAM_VIRTUALLY_FRAME" val="{&quot;height&quot;:308.1400787401575,&quot;left&quot;:87.65,&quot;top&quot;:147.6,&quot;width&quot;:811.4840944881887}"/>
-</p:tagLst>
-</file>
-
-<file path=ppt/tags/tag50.xml><?xml version="1.0" encoding="utf-8"?>
-<p:tagLst xmlns:p="http://schemas.openxmlformats.org/presentationml/2006/main">
-  <p:tag name="KSO_WM_DIAGRAM_VIRTUALLY_FRAME" val="{&quot;height&quot;:681.4749606299213,&quot;left&quot;:61.525039370078744,&quot;top&quot;:120.8,&quot;width&quot;:847.7499212598425}"/>
-</p:tagLst>
-</file>
-
-<file path=ppt/tags/tag51.xml><?xml version="1.0" encoding="utf-8"?>
-<p:tagLst xmlns:p="http://schemas.openxmlformats.org/presentationml/2006/main">
-  <p:tag name="KSO_WM_DIAGRAM_VIRTUALLY_FRAME" val="{&quot;height&quot;:681.4749606299213,&quot;left&quot;:61.525039370078744,&quot;top&quot;:120.8,&quot;width&quot;:847.7499212598425}"/>
 </p:tagLst>
 </file>
 

</xml_diff>